<commit_message>
fixing the data binding lecture
</commit_message>
<xml_diff>
--- a/2010/lectures/9. ASP.NET-Data-Binding.pptx
+++ b/2010/lectures/9. ASP.NET-Data-Binding.pptx
@@ -321,7 +321,7 @@
             <a:fld id="{3BF7C7B5-275F-4D1F-9AB4-9255447DBC73}" type="datetimeFigureOut">
               <a:rPr lang="en-US"/>
               <a:pPr/>
-              <a:t>10/3/2010</a:t>
+              <a:t>10/8/2010</a:t>
             </a:fld>
             <a:endParaRPr lang="en-US" dirty="0"/>
           </a:p>
@@ -552,7 +552,7 @@
             <a:fld id="{9B46F231-FB2B-4655-A644-E2477325E686}" type="datetimeFigureOut">
               <a:rPr lang="en-US"/>
               <a:pPr/>
-              <a:t>10/3/2010</a:t>
+              <a:t>10/8/2010</a:t>
             </a:fld>
             <a:endParaRPr lang="en-US" dirty="0"/>
           </a:p>
@@ -13073,12 +13073,8 @@
           <a:lstStyle/>
           <a:p>
             <a:r>
-              <a:rPr lang="en-US" smtClean="0"/>
-              <a:t>ASP.NET </a:t>
-            </a:r>
-            <a:r>
               <a:rPr lang="en-US" dirty="0" smtClean="0"/>
-              <a:t>Data Binding</a:t>
+              <a:t>ASP.NET Data Binding</a:t>
             </a:r>
             <a:endParaRPr lang="bg-BG" dirty="0" smtClean="0"/>
           </a:p>
@@ -13126,7 +13122,7 @@
         </p:nvSpPr>
         <p:spPr>
           <a:xfrm>
-            <a:off x="457200" y="5757446"/>
+            <a:off x="457200" y="5638800"/>
             <a:ext cx="2090957" cy="923330"/>
           </a:xfrm>
         </p:spPr>
@@ -13158,7 +13154,12 @@
             <p:ph type="body" sz="quarter" idx="12"/>
           </p:nvPr>
         </p:nvSpPr>
-        <p:spPr/>
+        <p:spPr>
+          <a:xfrm>
+            <a:off x="457200" y="5943600"/>
+            <a:ext cx="1707903" cy="338554"/>
+          </a:xfrm>
+        </p:spPr>
         <p:txBody>
           <a:bodyPr/>
           <a:lstStyle/>
@@ -16770,7 +16771,7 @@
           <a:p>
             <a:pPr marL="514350" indent="-514350">
               <a:lnSpc>
-                <a:spcPct val="110000"/>
+                <a:spcPct val="100000"/>
               </a:lnSpc>
               <a:buFont typeface="+mj-lt"/>
               <a:buAutoNum type="arabicPeriod"/>
@@ -16784,7 +16785,7 @@
           <a:p>
             <a:pPr marL="514350" indent="-514350">
               <a:lnSpc>
-                <a:spcPct val="110000"/>
+                <a:spcPct val="100000"/>
               </a:lnSpc>
               <a:buFont typeface="+mj-lt"/>
               <a:buAutoNum type="arabicPeriod"/>
@@ -16815,7 +16816,7 @@
           <a:p>
             <a:pPr marL="514350" indent="-514350">
               <a:lnSpc>
-                <a:spcPct val="110000"/>
+                <a:spcPct val="100000"/>
               </a:lnSpc>
               <a:buFont typeface="+mj-lt"/>
               <a:buAutoNum type="arabicPeriod"/>
@@ -16830,7 +16831,7 @@
           <a:p>
             <a:pPr marL="514350" indent="-514350">
               <a:lnSpc>
-                <a:spcPct val="110000"/>
+                <a:spcPct val="100000"/>
               </a:lnSpc>
               <a:buFont typeface="+mj-lt"/>
               <a:buAutoNum type="arabicPeriod"/>
@@ -16845,7 +16846,7 @@
           <a:p>
             <a:pPr marL="514350" indent="-514350">
               <a:lnSpc>
-                <a:spcPct val="110000"/>
+                <a:spcPct val="100000"/>
               </a:lnSpc>
               <a:buFont typeface="+mj-lt"/>
               <a:buAutoNum type="arabicPeriod"/>
@@ -16896,7 +16897,7 @@
           <a:p>
             <a:pPr marL="514350" indent="-514350">
               <a:lnSpc>
-                <a:spcPct val="110000"/>
+                <a:spcPct val="100000"/>
               </a:lnSpc>
               <a:buFont typeface="+mj-lt"/>
               <a:buAutoNum type="arabicPeriod"/>
@@ -17382,11 +17383,6 @@
                   <a:lumOff val="80000"/>
                 </a:schemeClr>
               </a:solidFill>
-              <a:effectLst>
-                <a:outerShdw blurRad="38100" dist="38100" dir="2700000" algn="tl">
-                  <a:srgbClr val="000000"/>
-                </a:outerShdw>
-              </a:effectLst>
               <a:latin typeface="Consolas" pitchFamily="49" charset="0"/>
             </a:endParaRPr>
           </a:p>
@@ -17552,14 +17548,13 @@
             <a:r>
               <a:rPr lang="bg-BG" sz="2400" b="1" dirty="0">
                 <a:solidFill>
-                  <a:srgbClr val="46A6BD">
-                    <a:lumMod val="20000"/>
-                    <a:lumOff val="80000"/>
-                  </a:srgbClr>
-                </a:solidFill>
-                <a:effectLst>
-                  <a:outerShdw blurRad="38100" dist="38100" dir="2700000" algn="tl">
-                    <a:srgbClr val="000000"/>
+                  <a:srgbClr val="8CF4F2"/>
+                </a:solidFill>
+                <a:effectLst>
+                  <a:outerShdw blurRad="38100" dist="38100" dir="2700000" algn="tl">
+                    <a:srgbClr val="000000">
+                      <a:alpha val="43137"/>
+                    </a:srgbClr>
                   </a:outerShdw>
                 </a:effectLst>
                 <a:latin typeface="Consolas" pitchFamily="49" charset="0"/>
@@ -17569,14 +17564,13 @@
             <a:r>
               <a:rPr lang="en-US" sz="2400" b="1" dirty="0">
                 <a:solidFill>
-                  <a:srgbClr val="46A6BD">
-                    <a:lumMod val="20000"/>
-                    <a:lumOff val="80000"/>
-                  </a:srgbClr>
-                </a:solidFill>
-                <a:effectLst>
-                  <a:outerShdw blurRad="38100" dist="38100" dir="2700000" algn="tl">
-                    <a:srgbClr val="000000"/>
+                  <a:srgbClr val="8CF4F2"/>
+                </a:solidFill>
+                <a:effectLst>
+                  <a:outerShdw blurRad="38100" dist="38100" dir="2700000" algn="tl">
+                    <a:srgbClr val="000000">
+                      <a:alpha val="43137"/>
+                    </a:srgbClr>
                   </a:outerShdw>
                 </a:effectLst>
                 <a:latin typeface="Consolas" pitchFamily="49" charset="0"/>
@@ -17586,14 +17580,13 @@
             <a:r>
               <a:rPr lang="bg-BG" sz="2400" b="1" dirty="0">
                 <a:solidFill>
-                  <a:srgbClr val="46A6BD">
-                    <a:lumMod val="20000"/>
-                    <a:lumOff val="80000"/>
-                  </a:srgbClr>
-                </a:solidFill>
-                <a:effectLst>
-                  <a:outerShdw blurRad="38100" dist="38100" dir="2700000" algn="tl">
-                    <a:srgbClr val="000000"/>
+                  <a:srgbClr val="8CF4F2"/>
+                </a:solidFill>
+                <a:effectLst>
+                  <a:outerShdw blurRad="38100" dist="38100" dir="2700000" algn="tl">
+                    <a:srgbClr val="000000">
+                      <a:alpha val="43137"/>
+                    </a:srgbClr>
                   </a:outerShdw>
                 </a:effectLst>
                 <a:latin typeface="Consolas" pitchFamily="49" charset="0"/>
@@ -18462,7 +18455,7 @@
         </p:nvSpPr>
         <p:spPr>
           <a:xfrm>
-            <a:off x="228600" y="990600"/>
+            <a:off x="228600" y="838200"/>
             <a:ext cx="8686800" cy="5715000"/>
           </a:xfrm>
         </p:spPr>
@@ -18472,7 +18465,7 @@
           <a:p>
             <a:pPr>
               <a:lnSpc>
-                <a:spcPct val="105000"/>
+                <a:spcPct val="100000"/>
               </a:lnSpc>
             </a:pPr>
             <a:r>
@@ -18490,6 +18483,10 @@
             <a:r>
               <a:rPr lang="bg-BG" dirty="0"/>
               <a:t> </a:t>
+            </a:r>
+            <a:r>
+              <a:rPr lang="en-US" dirty="0" smtClean="0"/>
+              <a:t>       </a:t>
             </a:r>
             <a:r>
               <a:rPr lang="en-US" noProof="1" smtClean="0">
@@ -18499,270 +18496,227 @@
                     <a:lumOff val="80000"/>
                   </a:schemeClr>
                 </a:solidFill>
-                <a:effectLst>
-                  <a:outerShdw blurRad="38100" dist="38100" dir="2700000" algn="tl">
-                    <a:srgbClr val="000000"/>
-                  </a:outerShdw>
-                </a:effectLst>
-                <a:latin typeface="Consolas" pitchFamily="49" charset="0"/>
-              </a:rPr>
-              <a:t>&lt;% Response.Write()%&gt;</a:t>
-            </a:r>
-            <a:r>
-              <a:rPr lang="bg-BG" dirty="0" smtClean="0"/>
-              <a:t> </a:t>
-            </a:r>
-            <a:r>
-              <a:rPr lang="en-US" dirty="0"/>
-              <a:t>its behavior is different</a:t>
-            </a:r>
-          </a:p>
-          <a:p>
-            <a:pPr>
-              <a:lnSpc>
-                <a:spcPct val="105000"/>
-              </a:lnSpc>
-            </a:pPr>
-            <a:r>
-              <a:rPr lang="en-US" noProof="1">
+                <a:latin typeface="Consolas" pitchFamily="49" charset="0"/>
+              </a:rPr>
+              <a:t>&lt;%Response.Write</a:t>
+            </a:r>
+            <a:r>
+              <a:rPr lang="en-US" noProof="1" smtClean="0">
                 <a:solidFill>
                   <a:schemeClr val="accent5">
                     <a:lumMod val="20000"/>
                     <a:lumOff val="80000"/>
                   </a:schemeClr>
                 </a:solidFill>
-                <a:effectLst>
-                  <a:outerShdw blurRad="38100" dist="38100" dir="2700000" algn="tl">
-                    <a:srgbClr val="000000"/>
-                  </a:outerShdw>
-                </a:effectLst>
-                <a:latin typeface="Consolas" pitchFamily="49" charset="0"/>
-              </a:rPr>
-              <a:t>Response.Write</a:t>
-            </a:r>
-            <a:r>
-              <a:rPr lang="bg-BG" dirty="0">
+                <a:latin typeface="Consolas" pitchFamily="49" charset="0"/>
+              </a:rPr>
+              <a:t>()%&gt;</a:t>
+            </a:r>
+            <a:r>
+              <a:rPr lang="bg-BG" dirty="0" smtClean="0"/>
+              <a:t> </a:t>
+            </a:r>
+            <a:r>
+              <a:rPr lang="en-US" dirty="0"/>
+              <a:t>its behavior is different</a:t>
+            </a:r>
+          </a:p>
+          <a:p>
+            <a:pPr>
+              <a:lnSpc>
+                <a:spcPct val="100000"/>
+              </a:lnSpc>
+            </a:pPr>
+            <a:r>
+              <a:rPr lang="en-US" noProof="1">
                 <a:solidFill>
                   <a:schemeClr val="accent5">
                     <a:lumMod val="20000"/>
                     <a:lumOff val="80000"/>
                   </a:schemeClr>
                 </a:solidFill>
-                <a:effectLst>
-                  <a:outerShdw blurRad="38100" dist="38100" dir="2700000" algn="tl">
-                    <a:srgbClr val="000000"/>
-                  </a:outerShdw>
-                </a:effectLst>
-                <a:latin typeface="Consolas" pitchFamily="49" charset="0"/>
-              </a:rPr>
-              <a:t>(…)</a:t>
-            </a:r>
-            <a:r>
-              <a:rPr lang="bg-BG" dirty="0"/>
-              <a:t> </a:t>
-            </a:r>
-            <a:r>
-              <a:rPr lang="en-US" dirty="0"/>
-              <a:t>is evaluated (calculated) when the page is compiled</a:t>
-            </a:r>
-          </a:p>
-          <a:p>
-            <a:pPr lvl="1">
-              <a:lnSpc>
-                <a:spcPct val="105000"/>
-              </a:lnSpc>
-            </a:pPr>
-            <a:r>
-              <a:rPr lang="en-US" dirty="0"/>
-              <a:t>The </a:t>
-            </a:r>
-            <a:r>
-              <a:rPr lang="en-US" dirty="0" smtClean="0"/>
-              <a:t>declarative binding syntax </a:t>
-            </a:r>
-            <a:r>
-              <a:rPr lang="en-US" dirty="0"/>
-              <a:t>is evaluated when the</a:t>
-            </a:r>
-            <a:r>
-              <a:rPr lang="bg-BG" dirty="0"/>
-              <a:t> </a:t>
-            </a:r>
-            <a:r>
-              <a:rPr lang="en-US" noProof="1">
+                <a:latin typeface="Consolas" pitchFamily="49" charset="0"/>
+              </a:rPr>
+              <a:t>Response.Write</a:t>
+            </a:r>
+            <a:r>
+              <a:rPr lang="bg-BG" dirty="0">
                 <a:solidFill>
                   <a:schemeClr val="accent5">
                     <a:lumMod val="20000"/>
                     <a:lumOff val="80000"/>
                   </a:schemeClr>
                 </a:solidFill>
-                <a:effectLst>
-                  <a:outerShdw blurRad="38100" dist="38100" dir="2700000" algn="tl">
-                    <a:srgbClr val="000000"/>
-                  </a:outerShdw>
-                </a:effectLst>
-                <a:latin typeface="Consolas" pitchFamily="49" charset="0"/>
-              </a:rPr>
-              <a:t>DataBind</a:t>
-            </a:r>
-            <a:r>
-              <a:rPr lang="bg-BG" dirty="0" smtClean="0">
+                <a:latin typeface="Consolas" pitchFamily="49" charset="0"/>
+              </a:rPr>
+              <a:t>(…)</a:t>
+            </a:r>
+            <a:r>
+              <a:rPr lang="bg-BG" dirty="0"/>
+              <a:t> </a:t>
+            </a:r>
+            <a:r>
+              <a:rPr lang="en-US" dirty="0"/>
+              <a:t>is evaluated (calculated) when the page is compiled</a:t>
+            </a:r>
+          </a:p>
+          <a:p>
+            <a:pPr lvl="1">
+              <a:lnSpc>
+                <a:spcPct val="100000"/>
+              </a:lnSpc>
+            </a:pPr>
+            <a:r>
+              <a:rPr lang="en-US" dirty="0"/>
+              <a:t>The </a:t>
+            </a:r>
+            <a:r>
+              <a:rPr lang="en-US" dirty="0" smtClean="0"/>
+              <a:t>declarative binding syntax </a:t>
+            </a:r>
+            <a:r>
+              <a:rPr lang="en-US" dirty="0"/>
+              <a:t>is evaluated when the</a:t>
+            </a:r>
+            <a:r>
+              <a:rPr lang="bg-BG" dirty="0"/>
+              <a:t> </a:t>
+            </a:r>
+            <a:r>
+              <a:rPr lang="en-US" noProof="1">
                 <a:solidFill>
                   <a:schemeClr val="accent5">
                     <a:lumMod val="20000"/>
                     <a:lumOff val="80000"/>
                   </a:schemeClr>
                 </a:solidFill>
-                <a:effectLst>
-                  <a:outerShdw blurRad="38100" dist="38100" dir="2700000" algn="tl">
-                    <a:srgbClr val="000000"/>
-                  </a:outerShdw>
-                </a:effectLst>
-                <a:latin typeface="Consolas" pitchFamily="49" charset="0"/>
-              </a:rPr>
-              <a:t>(…)</a:t>
-            </a:r>
-            <a:r>
-              <a:rPr lang="en-US" dirty="0"/>
-              <a:t> </a:t>
-            </a:r>
-            <a:r>
-              <a:rPr lang="en-US" dirty="0" smtClean="0"/>
-              <a:t>method </a:t>
-            </a:r>
-            <a:r>
-              <a:rPr lang="en-US" dirty="0"/>
-              <a:t>is called</a:t>
-            </a:r>
-          </a:p>
-          <a:p>
-            <a:pPr lvl="1">
-              <a:lnSpc>
-                <a:spcPct val="105000"/>
-              </a:lnSpc>
-            </a:pPr>
-            <a:r>
-              <a:rPr lang="en-US" dirty="0"/>
-              <a:t>If </a:t>
-            </a:r>
-            <a:r>
-              <a:rPr lang="en-US" noProof="1">
+                <a:latin typeface="Consolas" pitchFamily="49" charset="0"/>
+              </a:rPr>
+              <a:t>DataBind</a:t>
+            </a:r>
+            <a:r>
+              <a:rPr lang="bg-BG" dirty="0" smtClean="0">
                 <a:solidFill>
                   <a:schemeClr val="accent5">
                     <a:lumMod val="20000"/>
                     <a:lumOff val="80000"/>
                   </a:schemeClr>
                 </a:solidFill>
-                <a:effectLst>
-                  <a:outerShdw blurRad="38100" dist="38100" dir="2700000" algn="tl">
-                    <a:srgbClr val="000000"/>
-                  </a:outerShdw>
-                </a:effectLst>
-                <a:latin typeface="Consolas" pitchFamily="49" charset="0"/>
-              </a:rPr>
-              <a:t>DataBind</a:t>
-            </a:r>
-            <a:r>
-              <a:rPr lang="bg-BG" dirty="0">
+                <a:latin typeface="Consolas" pitchFamily="49" charset="0"/>
+              </a:rPr>
+              <a:t>(…)</a:t>
+            </a:r>
+            <a:r>
+              <a:rPr lang="en-US" dirty="0"/>
+              <a:t> </a:t>
+            </a:r>
+            <a:r>
+              <a:rPr lang="en-US" dirty="0" smtClean="0"/>
+              <a:t>method </a:t>
+            </a:r>
+            <a:r>
+              <a:rPr lang="en-US" dirty="0"/>
+              <a:t>is called</a:t>
+            </a:r>
+          </a:p>
+          <a:p>
+            <a:pPr lvl="1">
+              <a:lnSpc>
+                <a:spcPct val="100000"/>
+              </a:lnSpc>
+            </a:pPr>
+            <a:r>
+              <a:rPr lang="en-US" dirty="0"/>
+              <a:t>If </a:t>
+            </a:r>
+            <a:r>
+              <a:rPr lang="en-US" noProof="1">
                 <a:solidFill>
                   <a:schemeClr val="accent5">
                     <a:lumMod val="20000"/>
                     <a:lumOff val="80000"/>
                   </a:schemeClr>
                 </a:solidFill>
-                <a:effectLst>
-                  <a:outerShdw blurRad="38100" dist="38100" dir="2700000" algn="tl">
-                    <a:srgbClr val="000000"/>
-                  </a:outerShdw>
-                </a:effectLst>
-                <a:latin typeface="Consolas" pitchFamily="49" charset="0"/>
-              </a:rPr>
-              <a:t>(…)</a:t>
-            </a:r>
-            <a:r>
-              <a:rPr lang="en-US" dirty="0" smtClean="0"/>
-              <a:t> </a:t>
-            </a:r>
-            <a:r>
-              <a:rPr lang="en-US" dirty="0"/>
-              <a:t>is never </a:t>
-            </a:r>
-            <a:r>
-              <a:rPr lang="en-US" dirty="0" smtClean="0"/>
-              <a:t>called, </a:t>
-            </a:r>
-            <a:r>
-              <a:rPr lang="en-US" dirty="0"/>
-              <a:t>the expression</a:t>
-            </a:r>
-            <a:r>
-              <a:rPr lang="bg-BG" dirty="0"/>
-              <a:t> </a:t>
-            </a:r>
-            <a:r>
-              <a:rPr lang="en-US" dirty="0" smtClean="0">
+                <a:latin typeface="Consolas" pitchFamily="49" charset="0"/>
+              </a:rPr>
+              <a:t>DataBind</a:t>
+            </a:r>
+            <a:r>
+              <a:rPr lang="bg-BG" dirty="0">
                 <a:solidFill>
                   <a:schemeClr val="accent5">
                     <a:lumMod val="20000"/>
                     <a:lumOff val="80000"/>
                   </a:schemeClr>
                 </a:solidFill>
-                <a:effectLst>
-                  <a:outerShdw blurRad="38100" dist="38100" dir="2700000" algn="tl">
-                    <a:srgbClr val="000000"/>
-                  </a:outerShdw>
-                </a:effectLst>
-                <a:latin typeface="Consolas" pitchFamily="49" charset="0"/>
-              </a:rPr>
-              <a:t>&lt;%#</a:t>
-            </a:r>
-            <a:r>
-              <a:rPr lang="bg-BG" dirty="0" smtClean="0">
+                <a:latin typeface="Consolas" pitchFamily="49" charset="0"/>
+              </a:rPr>
+              <a:t>(…)</a:t>
+            </a:r>
+            <a:r>
+              <a:rPr lang="en-US" dirty="0" smtClean="0"/>
+              <a:t> </a:t>
+            </a:r>
+            <a:r>
+              <a:rPr lang="en-US" dirty="0"/>
+              <a:t>is never </a:t>
+            </a:r>
+            <a:r>
+              <a:rPr lang="en-US" dirty="0" smtClean="0"/>
+              <a:t>called, </a:t>
+            </a:r>
+            <a:r>
+              <a:rPr lang="en-US" dirty="0"/>
+              <a:t>the expression</a:t>
+            </a:r>
+            <a:r>
+              <a:rPr lang="bg-BG" dirty="0"/>
+              <a:t> </a:t>
+            </a:r>
+            <a:r>
+              <a:rPr lang="en-US" dirty="0" smtClean="0">
                 <a:solidFill>
                   <a:schemeClr val="accent5">
                     <a:lumMod val="20000"/>
                     <a:lumOff val="80000"/>
                   </a:schemeClr>
                 </a:solidFill>
-                <a:effectLst>
-                  <a:outerShdw blurRad="38100" dist="38100" dir="2700000" algn="tl">
-                    <a:srgbClr val="000000"/>
-                  </a:outerShdw>
-                </a:effectLst>
-                <a:latin typeface="Consolas" pitchFamily="49" charset="0"/>
-              </a:rPr>
-              <a:t> …</a:t>
-            </a:r>
-            <a:r>
-              <a:rPr lang="en-US" dirty="0" smtClean="0">
+                <a:latin typeface="Consolas" pitchFamily="49" charset="0"/>
+              </a:rPr>
+              <a:t>&lt;%#</a:t>
+            </a:r>
+            <a:r>
+              <a:rPr lang="bg-BG" dirty="0" smtClean="0">
                 <a:solidFill>
                   <a:schemeClr val="accent5">
                     <a:lumMod val="20000"/>
                     <a:lumOff val="80000"/>
                   </a:schemeClr>
                 </a:solidFill>
-                <a:effectLst>
-                  <a:outerShdw blurRad="38100" dist="38100" dir="2700000" algn="tl">
-                    <a:srgbClr val="000000"/>
-                  </a:outerShdw>
-                </a:effectLst>
-                <a:latin typeface="Consolas" pitchFamily="49" charset="0"/>
-              </a:rPr>
-              <a:t> </a:t>
-            </a:r>
-            <a:r>
-              <a:rPr lang="en-US" dirty="0">
+                <a:latin typeface="Consolas" pitchFamily="49" charset="0"/>
+              </a:rPr>
+              <a:t> …</a:t>
+            </a:r>
+            <a:r>
+              <a:rPr lang="en-US" dirty="0" smtClean="0">
                 <a:solidFill>
                   <a:schemeClr val="accent5">
                     <a:lumMod val="20000"/>
                     <a:lumOff val="80000"/>
                   </a:schemeClr>
                 </a:solidFill>
-                <a:effectLst>
-                  <a:outerShdw blurRad="38100" dist="38100" dir="2700000" algn="tl">
-                    <a:srgbClr val="000000"/>
-                  </a:outerShdw>
-                </a:effectLst>
+                <a:latin typeface="Consolas" pitchFamily="49" charset="0"/>
+              </a:rPr>
+              <a:t> </a:t>
+            </a:r>
+            <a:r>
+              <a:rPr lang="en-US" dirty="0">
+                <a:solidFill>
+                  <a:schemeClr val="accent5">
+                    <a:lumMod val="20000"/>
+                    <a:lumOff val="80000"/>
+                  </a:schemeClr>
+                </a:solidFill>
                 <a:latin typeface="Consolas" pitchFamily="49" charset="0"/>
               </a:rPr>
               <a:t>%&gt;</a:t>
@@ -18780,7 +18734,7 @@
           <a:p>
             <a:pPr lvl="1">
               <a:lnSpc>
-                <a:spcPct val="105000"/>
+                <a:spcPct val="100000"/>
               </a:lnSpc>
             </a:pPr>
             <a:r>
@@ -18968,7 +18922,7 @@
               <a:t>(…)</a:t>
             </a:r>
             <a:r>
-              <a:rPr lang="bg-BG" b="0" dirty="0"/>
+              <a:rPr lang="bg-BG" dirty="0"/>
               <a:t> </a:t>
             </a:r>
             <a:r>
@@ -19051,11 +19005,6 @@
                     <a:lumOff val="80000"/>
                   </a:schemeClr>
                 </a:solidFill>
-                <a:effectLst>
-                  <a:outerShdw blurRad="38100" dist="38100" dir="2700000" algn="tl">
-                    <a:srgbClr val="000000"/>
-                  </a:outerShdw>
-                </a:effectLst>
                 <a:latin typeface="Consolas" pitchFamily="49" charset="0"/>
               </a:rPr>
               <a:t>&lt;%#</a:t>
@@ -19068,11 +19017,6 @@
                     <a:lumOff val="80000"/>
                   </a:schemeClr>
                 </a:solidFill>
-                <a:effectLst>
-                  <a:outerShdw blurRad="38100" dist="38100" dir="2700000" algn="tl">
-                    <a:srgbClr val="000000"/>
-                  </a:outerShdw>
-                </a:effectLst>
                 <a:latin typeface="Consolas" pitchFamily="49" charset="0"/>
               </a:rPr>
               <a:t> … </a:t>
@@ -19085,11 +19029,6 @@
                     <a:lumOff val="80000"/>
                   </a:schemeClr>
                 </a:solidFill>
-                <a:effectLst>
-                  <a:outerShdw blurRad="38100" dist="38100" dir="2700000" algn="tl">
-                    <a:srgbClr val="000000"/>
-                  </a:outerShdw>
-                </a:effectLst>
                 <a:latin typeface="Consolas" pitchFamily="49" charset="0"/>
               </a:rPr>
               <a:t>%&gt;</a:t>
@@ -19813,7 +19752,7 @@
                 <a:latin typeface="Consolas" pitchFamily="49" charset="0"/>
                 <a:cs typeface="Consolas" pitchFamily="49" charset="0"/>
               </a:rPr>
-              <a:t>    </a:t>
+              <a:t>   </a:t>
             </a:r>
             <a:r>
               <a:rPr lang="en-US" sz="2000" b="1" noProof="1" smtClean="0">
@@ -20504,7 +20443,7 @@
                 <a:latin typeface="Consolas" pitchFamily="49" charset="0"/>
                 <a:cs typeface="Consolas" pitchFamily="49" charset="0"/>
               </a:rPr>
-              <a:t>  </a:t>
+              <a:t> </a:t>
             </a:r>
             <a:r>
               <a:rPr lang="en-US" sz="2000" b="1" noProof="1" smtClean="0">
@@ -20521,7 +20460,24 @@
                 <a:latin typeface="Consolas" pitchFamily="49" charset="0"/>
                 <a:cs typeface="Consolas" pitchFamily="49" charset="0"/>
               </a:rPr>
-              <a:t>Text="&lt;%#</a:t>
+              <a:t>Text</a:t>
+            </a:r>
+            <a:r>
+              <a:rPr lang="en-US" sz="2000" b="1" noProof="1" smtClean="0">
+                <a:solidFill>
+                  <a:srgbClr val="8CF4F2"/>
+                </a:solidFill>
+                <a:effectLst>
+                  <a:outerShdw blurRad="38100" dist="38100" dir="2700000" algn="tl">
+                    <a:srgbClr val="000000">
+                      <a:alpha val="43137"/>
+                    </a:srgbClr>
+                  </a:outerShdw>
+                </a:effectLst>
+                <a:latin typeface="Consolas" pitchFamily="49" charset="0"/>
+                <a:cs typeface="Consolas" pitchFamily="49" charset="0"/>
+              </a:rPr>
+              <a:t>="&lt;%#</a:t>
             </a:r>
             <a:r>
               <a:rPr lang="bg-BG" sz="2000" b="1" noProof="1" smtClean="0">
@@ -20623,7 +20579,24 @@
                 <a:latin typeface="Consolas" pitchFamily="49" charset="0"/>
                 <a:cs typeface="Consolas" pitchFamily="49" charset="0"/>
               </a:rPr>
-              <a:t>  runat</a:t>
+              <a:t> </a:t>
+            </a:r>
+            <a:r>
+              <a:rPr lang="en-US" sz="2000" b="1" noProof="1" smtClean="0">
+                <a:solidFill>
+                  <a:srgbClr val="8CF4F2"/>
+                </a:solidFill>
+                <a:effectLst>
+                  <a:outerShdw blurRad="38100" dist="38100" dir="2700000" algn="tl">
+                    <a:srgbClr val="000000">
+                      <a:alpha val="43137"/>
+                    </a:srgbClr>
+                  </a:outerShdw>
+                </a:effectLst>
+                <a:latin typeface="Consolas" pitchFamily="49" charset="0"/>
+                <a:cs typeface="Consolas" pitchFamily="49" charset="0"/>
+              </a:rPr>
+              <a:t>runat</a:t>
             </a:r>
             <a:r>
               <a:rPr lang="en-US" sz="2000" b="1" noProof="1">
@@ -21007,7 +20980,12 @@
             <p:ph idx="1"/>
           </p:nvPr>
         </p:nvSpPr>
-        <p:spPr/>
+        <p:spPr>
+          <a:xfrm>
+            <a:off x="228600" y="914400"/>
+            <a:ext cx="8686800" cy="5791200"/>
+          </a:xfrm>
+        </p:spPr>
         <p:txBody>
           <a:bodyPr/>
           <a:lstStyle/>
@@ -21677,7 +21655,7 @@
           <p:nvPr>
             <p:extLst>
               <p:ext uri="{D42A27DB-BD31-4B8C-83A1-F6EECF244321}">
-                <p14:modId xmlns:p14="http://schemas.microsoft.com/office/powerpoint/2010/main" val="2640412523"/>
+                <p14:modId xmlns:p14="http://schemas.microsoft.com/office/powerpoint/2010/main" val="3740816515"/>
               </p:ext>
             </p:extLst>
           </p:nvPr>
@@ -21945,9 +21923,9 @@
                       <a:r>
                         <a:rPr lang="en-US" sz="2200" b="1" kern="1200" dirty="0" smtClean="0">
                           <a:solidFill>
-                            <a:schemeClr val="tx1">
-                              <a:lumMod val="40000"/>
-                              <a:lumOff val="60000"/>
+                            <a:schemeClr val="accent5">
+                              <a:lumMod val="20000"/>
+                              <a:lumOff val="80000"/>
                             </a:schemeClr>
                           </a:solidFill>
                           <a:effectLst>
@@ -21965,9 +21943,9 @@
                       </a:r>
                       <a:endParaRPr lang="en-US" sz="2200" b="1" kern="1200" noProof="0" dirty="0" smtClean="0">
                         <a:solidFill>
-                          <a:schemeClr val="tx1">
-                            <a:lumMod val="40000"/>
-                            <a:lumOff val="60000"/>
+                          <a:schemeClr val="accent5">
+                            <a:lumMod val="20000"/>
+                            <a:lumOff val="80000"/>
                           </a:schemeClr>
                         </a:solidFill>
                         <a:effectLst>
@@ -22171,9 +22149,9 @@
                       <a:r>
                         <a:rPr lang="en-US" sz="2200" b="1" kern="1200" dirty="0" smtClean="0">
                           <a:solidFill>
-                            <a:schemeClr val="tx1">
-                              <a:lumMod val="40000"/>
-                              <a:lumOff val="60000"/>
+                            <a:schemeClr val="accent5">
+                              <a:lumMod val="20000"/>
+                              <a:lumOff val="80000"/>
                             </a:schemeClr>
                           </a:solidFill>
                           <a:effectLst>
@@ -22191,9 +22169,9 @@
                       </a:r>
                       <a:endParaRPr lang="bg-BG" sz="2200" b="1" kern="1200" noProof="0" dirty="0" smtClean="0">
                         <a:solidFill>
-                          <a:schemeClr val="tx1">
-                            <a:lumMod val="40000"/>
-                            <a:lumOff val="60000"/>
+                          <a:schemeClr val="accent5">
+                            <a:lumMod val="20000"/>
+                            <a:lumOff val="80000"/>
                           </a:schemeClr>
                         </a:solidFill>
                         <a:effectLst>
@@ -22397,9 +22375,9 @@
                       <a:r>
                         <a:rPr lang="en-US" sz="2200" b="1" kern="1200" dirty="0" smtClean="0">
                           <a:solidFill>
-                            <a:schemeClr val="tx1">
-                              <a:lumMod val="40000"/>
-                              <a:lumOff val="60000"/>
+                            <a:schemeClr val="accent5">
+                              <a:lumMod val="20000"/>
+                              <a:lumOff val="80000"/>
                             </a:schemeClr>
                           </a:solidFill>
                           <a:effectLst>
@@ -22417,9 +22395,9 @@
                       </a:r>
                       <a:endParaRPr lang="bg-BG" sz="2200" b="1" kern="1200" noProof="0" dirty="0" smtClean="0">
                         <a:solidFill>
-                          <a:schemeClr val="tx1">
-                            <a:lumMod val="40000"/>
-                            <a:lumOff val="60000"/>
+                          <a:schemeClr val="accent5">
+                            <a:lumMod val="20000"/>
+                            <a:lumOff val="80000"/>
                           </a:schemeClr>
                         </a:solidFill>
                         <a:effectLst>
@@ -22623,9 +22601,9 @@
                       <a:r>
                         <a:rPr lang="en-US" sz="2200" b="1" kern="1200" dirty="0" smtClean="0">
                           <a:solidFill>
-                            <a:schemeClr val="tx1">
-                              <a:lumMod val="40000"/>
-                              <a:lumOff val="60000"/>
+                            <a:schemeClr val="accent5">
+                              <a:lumMod val="20000"/>
+                              <a:lumOff val="80000"/>
                             </a:schemeClr>
                           </a:solidFill>
                           <a:effectLst>
@@ -22643,9 +22621,9 @@
                       </a:r>
                       <a:endParaRPr lang="bg-BG" sz="2200" b="1" kern="1200" noProof="0" dirty="0" smtClean="0">
                         <a:solidFill>
-                          <a:schemeClr val="tx1">
-                            <a:lumMod val="40000"/>
-                            <a:lumOff val="60000"/>
+                          <a:schemeClr val="accent5">
+                            <a:lumMod val="20000"/>
+                            <a:lumOff val="80000"/>
                           </a:schemeClr>
                         </a:solidFill>
                         <a:effectLst>
@@ -22849,9 +22827,9 @@
                       <a:r>
                         <a:rPr lang="en-US" sz="2200" b="1" kern="1200" dirty="0" smtClean="0">
                           <a:solidFill>
-                            <a:schemeClr val="tx1">
-                              <a:lumMod val="40000"/>
-                              <a:lumOff val="60000"/>
+                            <a:schemeClr val="accent5">
+                              <a:lumMod val="20000"/>
+                              <a:lumOff val="80000"/>
                             </a:schemeClr>
                           </a:solidFill>
                           <a:effectLst>
@@ -22869,9 +22847,9 @@
                       </a:r>
                       <a:endParaRPr lang="bg-BG" sz="2200" b="1" kern="1200" noProof="0" dirty="0" smtClean="0">
                         <a:solidFill>
-                          <a:schemeClr val="tx1">
-                            <a:lumMod val="40000"/>
-                            <a:lumOff val="60000"/>
+                          <a:schemeClr val="accent5">
+                            <a:lumMod val="20000"/>
+                            <a:lumOff val="80000"/>
                           </a:schemeClr>
                         </a:solidFill>
                         <a:effectLst>
@@ -23075,9 +23053,9 @@
                       <a:r>
                         <a:rPr lang="en-US" sz="2200" b="1" kern="1200" dirty="0" smtClean="0">
                           <a:solidFill>
-                            <a:schemeClr val="tx1">
-                              <a:lumMod val="40000"/>
-                              <a:lumOff val="60000"/>
+                            <a:schemeClr val="accent5">
+                              <a:lumMod val="20000"/>
+                              <a:lumOff val="80000"/>
                             </a:schemeClr>
                           </a:solidFill>
                           <a:effectLst>
@@ -23095,9 +23073,9 @@
                       </a:r>
                       <a:endParaRPr lang="bg-BG" sz="2200" b="1" kern="1200" noProof="0" dirty="0" smtClean="0">
                         <a:solidFill>
-                          <a:schemeClr val="tx1">
-                            <a:lumMod val="40000"/>
-                            <a:lumOff val="60000"/>
+                          <a:schemeClr val="accent5">
+                            <a:lumMod val="20000"/>
+                            <a:lumOff val="80000"/>
                           </a:schemeClr>
                         </a:solidFill>
                         <a:effectLst>
@@ -23301,9 +23279,9 @@
                       <a:r>
                         <a:rPr lang="en-US" sz="2200" b="1" kern="1200" dirty="0" smtClean="0">
                           <a:solidFill>
-                            <a:schemeClr val="tx1">
-                              <a:lumMod val="40000"/>
-                              <a:lumOff val="60000"/>
+                            <a:schemeClr val="accent5">
+                              <a:lumMod val="20000"/>
+                              <a:lumOff val="80000"/>
                             </a:schemeClr>
                           </a:solidFill>
                           <a:effectLst>
@@ -23321,9 +23299,9 @@
                       </a:r>
                       <a:endParaRPr lang="en-US" sz="2200" b="1" kern="1200" noProof="0" dirty="0" smtClean="0">
                         <a:solidFill>
-                          <a:schemeClr val="tx1">
-                            <a:lumMod val="40000"/>
-                            <a:lumOff val="60000"/>
+                          <a:schemeClr val="accent5">
+                            <a:lumMod val="20000"/>
+                            <a:lumOff val="80000"/>
                           </a:schemeClr>
                         </a:solidFill>
                         <a:effectLst>
@@ -23711,7 +23689,7 @@
                 <a:latin typeface="Consolas" pitchFamily="49" charset="0"/>
                 <a:cs typeface="Consolas" pitchFamily="49" charset="0"/>
               </a:rPr>
-              <a:t>    AutoGenerateColumns</a:t>
+              <a:t> AutoGenerateColumns</a:t>
             </a:r>
             <a:r>
               <a:rPr lang="en-US" sz="2000" b="1" noProof="1">
@@ -23898,7 +23876,24 @@
                 <a:latin typeface="Consolas" pitchFamily="49" charset="0"/>
                 <a:cs typeface="Consolas" pitchFamily="49" charset="0"/>
               </a:rPr>
-              <a:t>      HeaderText</a:t>
+              <a:t>     </a:t>
+            </a:r>
+            <a:r>
+              <a:rPr lang="en-US" sz="2000" b="1" noProof="1" smtClean="0">
+                <a:solidFill>
+                  <a:srgbClr val="8CF4F2"/>
+                </a:solidFill>
+                <a:effectLst>
+                  <a:outerShdw blurRad="38100" dist="38100" dir="2700000" algn="tl">
+                    <a:srgbClr val="000000">
+                      <a:alpha val="43137"/>
+                    </a:srgbClr>
+                  </a:outerShdw>
+                </a:effectLst>
+                <a:latin typeface="Consolas" pitchFamily="49" charset="0"/>
+                <a:cs typeface="Consolas" pitchFamily="49" charset="0"/>
+              </a:rPr>
+              <a:t>HeaderText</a:t>
             </a:r>
             <a:r>
               <a:rPr lang="en-US" sz="2000" b="1" noProof="1">
@@ -24051,7 +24046,24 @@
                 <a:latin typeface="Consolas" pitchFamily="49" charset="0"/>
                 <a:cs typeface="Consolas" pitchFamily="49" charset="0"/>
               </a:rPr>
-              <a:t>     HeaderText</a:t>
+              <a:t>    </a:t>
+            </a:r>
+            <a:r>
+              <a:rPr lang="en-US" sz="2000" b="1" noProof="1" smtClean="0">
+                <a:solidFill>
+                  <a:srgbClr val="8CF4F2"/>
+                </a:solidFill>
+                <a:effectLst>
+                  <a:outerShdw blurRad="38100" dist="38100" dir="2700000" algn="tl">
+                    <a:srgbClr val="000000">
+                      <a:alpha val="43137"/>
+                    </a:srgbClr>
+                  </a:outerShdw>
+                </a:effectLst>
+                <a:latin typeface="Consolas" pitchFamily="49" charset="0"/>
+                <a:cs typeface="Consolas" pitchFamily="49" charset="0"/>
+              </a:rPr>
+              <a:t>HeaderText</a:t>
             </a:r>
             <a:r>
               <a:rPr lang="en-US" sz="2000" b="1" noProof="1">
@@ -24204,7 +24216,24 @@
                 <a:latin typeface="Consolas" pitchFamily="49" charset="0"/>
                 <a:cs typeface="Consolas" pitchFamily="49" charset="0"/>
               </a:rPr>
-              <a:t>     HeaderText</a:t>
+              <a:t>    </a:t>
+            </a:r>
+            <a:r>
+              <a:rPr lang="en-US" sz="2000" b="1" noProof="1" smtClean="0">
+                <a:solidFill>
+                  <a:srgbClr val="8CF4F2"/>
+                </a:solidFill>
+                <a:effectLst>
+                  <a:outerShdw blurRad="38100" dist="38100" dir="2700000" algn="tl">
+                    <a:srgbClr val="000000">
+                      <a:alpha val="43137"/>
+                    </a:srgbClr>
+                  </a:outerShdw>
+                </a:effectLst>
+                <a:latin typeface="Consolas" pitchFamily="49" charset="0"/>
+                <a:cs typeface="Consolas" pitchFamily="49" charset="0"/>
+              </a:rPr>
+              <a:t>HeaderText</a:t>
             </a:r>
             <a:r>
               <a:rPr lang="en-US" sz="2000" b="1" noProof="1">
@@ -24357,7 +24386,24 @@
                 <a:latin typeface="Consolas" pitchFamily="49" charset="0"/>
                 <a:cs typeface="Consolas" pitchFamily="49" charset="0"/>
               </a:rPr>
-              <a:t>     HeaderText</a:t>
+              <a:t>    </a:t>
+            </a:r>
+            <a:r>
+              <a:rPr lang="en-US" sz="2000" b="1" noProof="1" smtClean="0">
+                <a:solidFill>
+                  <a:srgbClr val="8CF4F2"/>
+                </a:solidFill>
+                <a:effectLst>
+                  <a:outerShdw blurRad="38100" dist="38100" dir="2700000" algn="tl">
+                    <a:srgbClr val="000000">
+                      <a:alpha val="43137"/>
+                    </a:srgbClr>
+                  </a:outerShdw>
+                </a:effectLst>
+                <a:latin typeface="Consolas" pitchFamily="49" charset="0"/>
+                <a:cs typeface="Consolas" pitchFamily="49" charset="0"/>
+              </a:rPr>
+              <a:t>HeaderText</a:t>
             </a:r>
             <a:r>
               <a:rPr lang="en-US" sz="2000" b="1" noProof="1">
@@ -24510,7 +24556,24 @@
                 <a:latin typeface="Consolas" pitchFamily="49" charset="0"/>
                 <a:cs typeface="Consolas" pitchFamily="49" charset="0"/>
               </a:rPr>
-              <a:t>     HeaderText</a:t>
+              <a:t>    </a:t>
+            </a:r>
+            <a:r>
+              <a:rPr lang="en-US" sz="2000" b="1" noProof="1" smtClean="0">
+                <a:solidFill>
+                  <a:srgbClr val="8CF4F2"/>
+                </a:solidFill>
+                <a:effectLst>
+                  <a:outerShdw blurRad="38100" dist="38100" dir="2700000" algn="tl">
+                    <a:srgbClr val="000000">
+                      <a:alpha val="43137"/>
+                    </a:srgbClr>
+                  </a:outerShdw>
+                </a:effectLst>
+                <a:latin typeface="Consolas" pitchFamily="49" charset="0"/>
+                <a:cs typeface="Consolas" pitchFamily="49" charset="0"/>
+              </a:rPr>
+              <a:t>HeaderText</a:t>
             </a:r>
             <a:r>
               <a:rPr lang="en-US" sz="2000" b="1" noProof="1">
@@ -24713,8 +24776,8 @@
         </p:nvSpPr>
         <p:spPr bwMode="auto">
           <a:xfrm>
-            <a:off x="685800" y="1263908"/>
-            <a:ext cx="7772400" cy="4832092"/>
+            <a:off x="228600" y="1263908"/>
+            <a:ext cx="8686800" cy="5170646"/>
           </a:xfrm>
           <a:prstGeom prst="rect">
             <a:avLst/>
@@ -24842,6 +24905,23 @@
               <a:t>  </a:t>
             </a:r>
             <a:r>
+              <a:rPr lang="en-US" sz="2000" b="1" noProof="1" smtClean="0">
+                <a:solidFill>
+                  <a:srgbClr val="8CF4F2"/>
+                </a:solidFill>
+                <a:effectLst>
+                  <a:outerShdw blurRad="38100" dist="38100" dir="2700000" algn="tl">
+                    <a:srgbClr val="000000">
+                      <a:alpha val="43137"/>
+                    </a:srgbClr>
+                  </a:outerShdw>
+                </a:effectLst>
+                <a:latin typeface="Consolas" pitchFamily="49" charset="0"/>
+                <a:cs typeface="Consolas" pitchFamily="49" charset="0"/>
+              </a:rPr>
+              <a:t> List&lt;Customer</a:t>
+            </a:r>
+            <a:r>
               <a:rPr lang="en-US" sz="2000" b="1" noProof="1">
                 <a:solidFill>
                   <a:srgbClr val="8CF4F2"/>
@@ -24856,7 +24936,7 @@
                 <a:latin typeface="Consolas" pitchFamily="49" charset="0"/>
                 <a:cs typeface="Consolas" pitchFamily="49" charset="0"/>
               </a:rPr>
-              <a:t>List&lt;Customer&gt; customers = new List&lt;Customer&gt;()</a:t>
+              <a:t>&gt; customers = new List&lt;Customer&gt;()</a:t>
             </a:r>
           </a:p>
           <a:p>
@@ -24893,7 +24973,7 @@
               <a:t>  </a:t>
             </a:r>
             <a:r>
-              <a:rPr lang="en-US" sz="2000" b="1" noProof="1">
+              <a:rPr lang="en-US" sz="2000" b="1" noProof="1" smtClean="0">
                 <a:solidFill>
                   <a:srgbClr val="8CF4F2"/>
                 </a:solidFill>
@@ -24907,8 +24987,22 @@
                 <a:latin typeface="Consolas" pitchFamily="49" charset="0"/>
                 <a:cs typeface="Consolas" pitchFamily="49" charset="0"/>
               </a:rPr>
-              <a:t>{</a:t>
-            </a:r>
+              <a:t> {</a:t>
+            </a:r>
+            <a:endParaRPr lang="en-US" sz="2000" b="1" noProof="1">
+              <a:solidFill>
+                <a:srgbClr val="8CF4F2"/>
+              </a:solidFill>
+              <a:effectLst>
+                <a:outerShdw blurRad="38100" dist="38100" dir="2700000" algn="tl">
+                  <a:srgbClr val="000000">
+                    <a:alpha val="43137"/>
+                  </a:srgbClr>
+                </a:outerShdw>
+              </a:effectLst>
+              <a:latin typeface="Consolas" pitchFamily="49" charset="0"/>
+              <a:cs typeface="Consolas" pitchFamily="49" charset="0"/>
+            </a:endParaRPr>
           </a:p>
           <a:p>
             <a:pPr eaLnBrk="0" hangingPunct="0">
@@ -24944,6 +25038,23 @@
               <a:t>    </a:t>
             </a:r>
             <a:r>
+              <a:rPr lang="en-US" sz="2000" b="1" noProof="1" smtClean="0">
+                <a:solidFill>
+                  <a:srgbClr val="8CF4F2"/>
+                </a:solidFill>
+                <a:effectLst>
+                  <a:outerShdw blurRad="38100" dist="38100" dir="2700000" algn="tl">
+                    <a:srgbClr val="000000">
+                      <a:alpha val="43137"/>
+                    </a:srgbClr>
+                  </a:outerShdw>
+                </a:effectLst>
+                <a:latin typeface="Consolas" pitchFamily="49" charset="0"/>
+                <a:cs typeface="Consolas" pitchFamily="49" charset="0"/>
+              </a:rPr>
+              <a:t>  new </a:t>
+            </a:r>
+            <a:r>
               <a:rPr lang="en-US" sz="2000" b="1" noProof="1">
                 <a:solidFill>
                   <a:srgbClr val="8CF4F2"/>
@@ -24958,7 +25069,7 @@
                 <a:latin typeface="Consolas" pitchFamily="49" charset="0"/>
                 <a:cs typeface="Consolas" pitchFamily="49" charset="0"/>
               </a:rPr>
-              <a:t>new Customer() { FirstName = "Svetlin</a:t>
+              <a:t>Customer() { FirstName = "Svetlin</a:t>
             </a:r>
             <a:r>
               <a:rPr lang="en-US" sz="2000" b="1" noProof="1" smtClean="0">
@@ -25026,7 +25137,24 @@
                 <a:latin typeface="Consolas" pitchFamily="49" charset="0"/>
                 <a:cs typeface="Consolas" pitchFamily="49" charset="0"/>
               </a:rPr>
-              <a:t>     LastName </a:t>
+              <a:t>     </a:t>
+            </a:r>
+            <a:r>
+              <a:rPr lang="en-US" sz="2000" b="1" noProof="1" smtClean="0">
+                <a:solidFill>
+                  <a:srgbClr val="8CF4F2"/>
+                </a:solidFill>
+                <a:effectLst>
+                  <a:outerShdw blurRad="38100" dist="38100" dir="2700000" algn="tl">
+                    <a:srgbClr val="000000">
+                      <a:alpha val="43137"/>
+                    </a:srgbClr>
+                  </a:outerShdw>
+                </a:effectLst>
+                <a:latin typeface="Consolas" pitchFamily="49" charset="0"/>
+                <a:cs typeface="Consolas" pitchFamily="49" charset="0"/>
+              </a:rPr>
+              <a:t> LastName </a:t>
             </a:r>
             <a:r>
               <a:rPr lang="en-US" sz="2000" b="1" noProof="1">
@@ -25046,6 +25174,23 @@
               <a:t>= "Nakov", </a:t>
             </a:r>
             <a:r>
+              <a:rPr lang="en-US" sz="2000" b="1" noProof="1">
+                <a:solidFill>
+                  <a:srgbClr val="8CF4F2"/>
+                </a:solidFill>
+                <a:effectLst>
+                  <a:outerShdw blurRad="38100" dist="38100" dir="2700000" algn="tl">
+                    <a:srgbClr val="000000">
+                      <a:alpha val="43137"/>
+                    </a:srgbClr>
+                  </a:outerShdw>
+                </a:effectLst>
+                <a:latin typeface="Consolas" pitchFamily="49" charset="0"/>
+                <a:cs typeface="Consolas" pitchFamily="49" charset="0"/>
+              </a:rPr>
+              <a:t>IsSenior=true </a:t>
+            </a:r>
+            <a:r>
               <a:rPr lang="en-US" sz="2000" b="1" noProof="1" smtClean="0">
                 <a:solidFill>
                   <a:srgbClr val="8CF4F2"/>
@@ -25060,41 +25205,7 @@
                 <a:latin typeface="Consolas" pitchFamily="49" charset="0"/>
                 <a:cs typeface="Consolas" pitchFamily="49" charset="0"/>
               </a:rPr>
-              <a:t>Email </a:t>
-            </a:r>
-            <a:r>
-              <a:rPr lang="en-US" sz="2000" b="1" noProof="1">
-                <a:solidFill>
-                  <a:srgbClr val="8CF4F2"/>
-                </a:solidFill>
-                <a:effectLst>
-                  <a:outerShdw blurRad="38100" dist="38100" dir="2700000" algn="tl">
-                    <a:srgbClr val="000000">
-                      <a:alpha val="43137"/>
-                    </a:srgbClr>
-                  </a:outerShdw>
-                </a:effectLst>
-                <a:latin typeface="Consolas" pitchFamily="49" charset="0"/>
-                <a:cs typeface="Consolas" pitchFamily="49" charset="0"/>
-              </a:rPr>
-              <a:t>= "svetlin@nakov.com</a:t>
-            </a:r>
-            <a:r>
-              <a:rPr lang="en-US" sz="2000" b="1" noProof="1" smtClean="0">
-                <a:solidFill>
-                  <a:srgbClr val="8CF4F2"/>
-                </a:solidFill>
-                <a:effectLst>
-                  <a:outerShdw blurRad="38100" dist="38100" dir="2700000" algn="tl">
-                    <a:srgbClr val="000000">
-                      <a:alpha val="43137"/>
-                    </a:srgbClr>
-                  </a:outerShdw>
-                </a:effectLst>
-                <a:latin typeface="Consolas" pitchFamily="49" charset="0"/>
-                <a:cs typeface="Consolas" pitchFamily="49" charset="0"/>
-              </a:rPr>
-              <a:t>",</a:t>
+              <a:t>,</a:t>
             </a:r>
           </a:p>
           <a:p>
@@ -25145,7 +25256,7 @@
                 <a:latin typeface="Consolas" pitchFamily="49" charset="0"/>
                 <a:cs typeface="Consolas" pitchFamily="49" charset="0"/>
               </a:rPr>
-              <a:t>     </a:t>
+              <a:t>      Email </a:t>
             </a:r>
             <a:r>
               <a:rPr lang="en-US" sz="2000" b="1" noProof="1">
@@ -25162,7 +25273,58 @@
                 <a:latin typeface="Consolas" pitchFamily="49" charset="0"/>
                 <a:cs typeface="Consolas" pitchFamily="49" charset="0"/>
               </a:rPr>
-              <a:t>Phone = "0894 77 22 53", IsSenior=true },</a:t>
+              <a:t>= "svetlin@nakov.com</a:t>
+            </a:r>
+            <a:r>
+              <a:rPr lang="en-US" sz="2000" b="1" noProof="1" smtClean="0">
+                <a:solidFill>
+                  <a:srgbClr val="8CF4F2"/>
+                </a:solidFill>
+                <a:effectLst>
+                  <a:outerShdw blurRad="38100" dist="38100" dir="2700000" algn="tl">
+                    <a:srgbClr val="000000">
+                      <a:alpha val="43137"/>
+                    </a:srgbClr>
+                  </a:outerShdw>
+                </a:effectLst>
+                <a:latin typeface="Consolas" pitchFamily="49" charset="0"/>
+                <a:cs typeface="Consolas" pitchFamily="49" charset="0"/>
+              </a:rPr>
+              <a:t>",Phone </a:t>
+            </a:r>
+            <a:r>
+              <a:rPr lang="en-US" sz="2000" b="1" noProof="1">
+                <a:solidFill>
+                  <a:srgbClr val="8CF4F2"/>
+                </a:solidFill>
+                <a:effectLst>
+                  <a:outerShdw blurRad="38100" dist="38100" dir="2700000" algn="tl">
+                    <a:srgbClr val="000000">
+                      <a:alpha val="43137"/>
+                    </a:srgbClr>
+                  </a:outerShdw>
+                </a:effectLst>
+                <a:latin typeface="Consolas" pitchFamily="49" charset="0"/>
+                <a:cs typeface="Consolas" pitchFamily="49" charset="0"/>
+              </a:rPr>
+              <a:t>= "0894 77 </a:t>
+            </a:r>
+            <a:r>
+              <a:rPr lang="en-US" sz="2000" b="1" noProof="1" smtClean="0">
+                <a:solidFill>
+                  <a:srgbClr val="8CF4F2"/>
+                </a:solidFill>
+                <a:effectLst>
+                  <a:outerShdw blurRad="38100" dist="38100" dir="2700000" algn="tl">
+                    <a:srgbClr val="000000">
+                      <a:alpha val="43137"/>
+                    </a:srgbClr>
+                  </a:outerShdw>
+                </a:effectLst>
+                <a:latin typeface="Consolas" pitchFamily="49" charset="0"/>
+                <a:cs typeface="Consolas" pitchFamily="49" charset="0"/>
+              </a:rPr>
+              <a:t>22 53"    </a:t>
             </a:r>
           </a:p>
           <a:p>
@@ -25182,6 +25344,23 @@
               <a:buSzPct val="70000"/>
             </a:pPr>
             <a:r>
+              <a:rPr lang="en-US" sz="2000" b="1" noProof="1">
+                <a:solidFill>
+                  <a:srgbClr val="8CF4F2"/>
+                </a:solidFill>
+                <a:effectLst>
+                  <a:outerShdw blurRad="38100" dist="38100" dir="2700000" algn="tl">
+                    <a:srgbClr val="000000">
+                      <a:alpha val="43137"/>
+                    </a:srgbClr>
+                  </a:outerShdw>
+                </a:effectLst>
+                <a:latin typeface="Consolas" pitchFamily="49" charset="0"/>
+                <a:cs typeface="Consolas" pitchFamily="49" charset="0"/>
+              </a:rPr>
+              <a:t> </a:t>
+            </a:r>
+            <a:r>
               <a:rPr lang="en-US" sz="2000" b="1" noProof="1" smtClean="0">
                 <a:solidFill>
                   <a:srgbClr val="8CF4F2"/>
@@ -25196,9 +25375,91 @@
                 <a:latin typeface="Consolas" pitchFamily="49" charset="0"/>
                 <a:cs typeface="Consolas" pitchFamily="49" charset="0"/>
               </a:rPr>
+              <a:t>     </a:t>
+            </a:r>
+            <a:r>
+              <a:rPr lang="en-US" sz="2000" b="1" noProof="1" smtClean="0">
+                <a:solidFill>
+                  <a:srgbClr val="8CF4F2"/>
+                </a:solidFill>
+                <a:effectLst>
+                  <a:outerShdw blurRad="38100" dist="38100" dir="2700000" algn="tl">
+                    <a:srgbClr val="000000">
+                      <a:alpha val="43137"/>
+                    </a:srgbClr>
+                  </a:outerShdw>
+                </a:effectLst>
+                <a:latin typeface="Consolas" pitchFamily="49" charset="0"/>
+                <a:cs typeface="Consolas" pitchFamily="49" charset="0"/>
+              </a:rPr>
+              <a:t>},</a:t>
+            </a:r>
+            <a:endParaRPr lang="en-US" sz="2000" b="1" noProof="1">
+              <a:solidFill>
+                <a:srgbClr val="8CF4F2"/>
+              </a:solidFill>
+              <a:effectLst>
+                <a:outerShdw blurRad="38100" dist="38100" dir="2700000" algn="tl">
+                  <a:srgbClr val="000000">
+                    <a:alpha val="43137"/>
+                  </a:srgbClr>
+                </a:outerShdw>
+              </a:effectLst>
+              <a:latin typeface="Consolas" pitchFamily="49" charset="0"/>
+              <a:cs typeface="Consolas" pitchFamily="49" charset="0"/>
+            </a:endParaRPr>
+          </a:p>
+          <a:p>
+            <a:pPr eaLnBrk="0" hangingPunct="0">
+              <a:lnSpc>
+                <a:spcPct val="110000"/>
+              </a:lnSpc>
+              <a:spcBef>
+                <a:spcPts val="0"/>
+              </a:spcBef>
+              <a:buClr>
+                <a:schemeClr val="accent5">
+                  <a:lumMod val="40000"/>
+                  <a:lumOff val="60000"/>
+                </a:schemeClr>
+              </a:buClr>
+              <a:buSzPct val="70000"/>
+            </a:pPr>
+            <a:r>
+              <a:rPr lang="en-US" sz="2000" b="1" noProof="1" smtClean="0">
+                <a:solidFill>
+                  <a:srgbClr val="8CF4F2"/>
+                </a:solidFill>
+                <a:effectLst>
+                  <a:outerShdw blurRad="38100" dist="38100" dir="2700000" algn="tl">
+                    <a:srgbClr val="000000">
+                      <a:alpha val="43137"/>
+                    </a:srgbClr>
+                  </a:outerShdw>
+                </a:effectLst>
+                <a:latin typeface="Consolas" pitchFamily="49" charset="0"/>
+                <a:cs typeface="Consolas" pitchFamily="49" charset="0"/>
+              </a:rPr>
               <a:t>    </a:t>
             </a:r>
             <a:r>
+              <a:rPr lang="en-US" sz="2000" b="1" noProof="1" smtClean="0">
+                <a:solidFill>
+                  <a:srgbClr val="8CF4F2"/>
+                </a:solidFill>
+                <a:effectLst>
+                  <a:outerShdw blurRad="38100" dist="38100" dir="2700000" algn="tl">
+                    <a:srgbClr val="000000">
+                      <a:alpha val="43137"/>
+                    </a:srgbClr>
+                  </a:outerShdw>
+                </a:effectLst>
+                <a:latin typeface="Consolas" pitchFamily="49" charset="0"/>
+                <a:cs typeface="Consolas" pitchFamily="49" charset="0"/>
+              </a:rPr>
+              <a:t>  new </a:t>
+            </a:r>
+            <a:r>
               <a:rPr lang="en-US" sz="2000" b="1" noProof="1">
                 <a:solidFill>
                   <a:srgbClr val="8CF4F2"/>
@@ -25213,7 +25474,41 @@
                 <a:latin typeface="Consolas" pitchFamily="49" charset="0"/>
                 <a:cs typeface="Consolas" pitchFamily="49" charset="0"/>
               </a:rPr>
-              <a:t>new Customer() { FirstName = "Bai", </a:t>
+              <a:t>Customer() { FirstName = "Bai</a:t>
+            </a:r>
+            <a:r>
+              <a:rPr lang="en-US" sz="2000" b="1" noProof="1" smtClean="0">
+                <a:solidFill>
+                  <a:srgbClr val="8CF4F2"/>
+                </a:solidFill>
+                <a:effectLst>
+                  <a:outerShdw blurRad="38100" dist="38100" dir="2700000" algn="tl">
+                    <a:srgbClr val="000000">
+                      <a:alpha val="43137"/>
+                    </a:srgbClr>
+                  </a:outerShdw>
+                </a:effectLst>
+                <a:latin typeface="Consolas" pitchFamily="49" charset="0"/>
+                <a:cs typeface="Consolas" pitchFamily="49" charset="0"/>
+              </a:rPr>
+              <a:t>", LastName </a:t>
+            </a:r>
+            <a:r>
+              <a:rPr lang="en-US" sz="2000" b="1" noProof="1">
+                <a:solidFill>
+                  <a:srgbClr val="8CF4F2"/>
+                </a:solidFill>
+                <a:effectLst>
+                  <a:outerShdw blurRad="38100" dist="38100" dir="2700000" algn="tl">
+                    <a:srgbClr val="000000">
+                      <a:alpha val="43137"/>
+                    </a:srgbClr>
+                  </a:outerShdw>
+                </a:effectLst>
+                <a:latin typeface="Consolas" pitchFamily="49" charset="0"/>
+                <a:cs typeface="Consolas" pitchFamily="49" charset="0"/>
+              </a:rPr>
+              <a:t>= "Ivan", </a:t>
             </a:r>
             <a:endParaRPr lang="en-US" sz="2000" b="1" noProof="1" smtClean="0">
               <a:solidFill>
@@ -25278,7 +25573,24 @@
                 <a:latin typeface="Consolas" pitchFamily="49" charset="0"/>
                 <a:cs typeface="Consolas" pitchFamily="49" charset="0"/>
               </a:rPr>
-              <a:t>     LastName </a:t>
+              <a:t>      </a:t>
+            </a:r>
+            <a:r>
+              <a:rPr lang="en-US" sz="2000" b="1" noProof="1" smtClean="0">
+                <a:solidFill>
+                  <a:srgbClr val="8CF4F2"/>
+                </a:solidFill>
+                <a:effectLst>
+                  <a:outerShdw blurRad="38100" dist="38100" dir="2700000" algn="tl">
+                    <a:srgbClr val="000000">
+                      <a:alpha val="43137"/>
+                    </a:srgbClr>
+                  </a:outerShdw>
+                </a:effectLst>
+                <a:latin typeface="Consolas" pitchFamily="49" charset="0"/>
+                <a:cs typeface="Consolas" pitchFamily="49" charset="0"/>
+              </a:rPr>
+              <a:t>Email </a:t>
             </a:r>
             <a:r>
               <a:rPr lang="en-US" sz="2000" b="1" noProof="1">
@@ -25295,7 +25607,7 @@
                 <a:latin typeface="Consolas" pitchFamily="49" charset="0"/>
                 <a:cs typeface="Consolas" pitchFamily="49" charset="0"/>
               </a:rPr>
-              <a:t>= "Ivan", Email = "bai.ivan@gmail.com</a:t>
+              <a:t>= "bai.ivan@gmail.com</a:t>
             </a:r>
             <a:r>
               <a:rPr lang="en-US" sz="2000" b="1" noProof="1" smtClean="0">
@@ -25312,8 +25624,39 @@
                 <a:latin typeface="Consolas" pitchFamily="49" charset="0"/>
                 <a:cs typeface="Consolas" pitchFamily="49" charset="0"/>
               </a:rPr>
-              <a:t>",</a:t>
-            </a:r>
+              <a:t>", Phone </a:t>
+            </a:r>
+            <a:r>
+              <a:rPr lang="en-US" sz="2000" b="1" noProof="1">
+                <a:solidFill>
+                  <a:srgbClr val="8CF4F2"/>
+                </a:solidFill>
+                <a:effectLst>
+                  <a:outerShdw blurRad="38100" dist="38100" dir="2700000" algn="tl">
+                    <a:srgbClr val="000000">
+                      <a:alpha val="43137"/>
+                    </a:srgbClr>
+                  </a:outerShdw>
+                </a:effectLst>
+                <a:latin typeface="Consolas" pitchFamily="49" charset="0"/>
+                <a:cs typeface="Consolas" pitchFamily="49" charset="0"/>
+              </a:rPr>
+              <a:t>= "0899 555 444" </a:t>
+            </a:r>
+            <a:endParaRPr lang="en-US" sz="2000" b="1" noProof="1" smtClean="0">
+              <a:solidFill>
+                <a:srgbClr val="8CF4F2"/>
+              </a:solidFill>
+              <a:effectLst>
+                <a:outerShdw blurRad="38100" dist="38100" dir="2700000" algn="tl">
+                  <a:srgbClr val="000000">
+                    <a:alpha val="43137"/>
+                  </a:srgbClr>
+                </a:outerShdw>
+              </a:effectLst>
+              <a:latin typeface="Consolas" pitchFamily="49" charset="0"/>
+              <a:cs typeface="Consolas" pitchFamily="49" charset="0"/>
+            </a:endParaRPr>
           </a:p>
           <a:p>
             <a:pPr eaLnBrk="0" hangingPunct="0">
@@ -25363,10 +25706,10 @@
                 <a:latin typeface="Consolas" pitchFamily="49" charset="0"/>
                 <a:cs typeface="Consolas" pitchFamily="49" charset="0"/>
               </a:rPr>
-              <a:t>     Phone </a:t>
-            </a:r>
-            <a:r>
-              <a:rPr lang="en-US" sz="2000" b="1" noProof="1">
+              <a:t>     </a:t>
+            </a:r>
+            <a:r>
+              <a:rPr lang="en-US" sz="2000" b="1" noProof="1" smtClean="0">
                 <a:solidFill>
                   <a:srgbClr val="8CF4F2"/>
                 </a:solidFill>
@@ -25380,8 +25723,22 @@
                 <a:latin typeface="Consolas" pitchFamily="49" charset="0"/>
                 <a:cs typeface="Consolas" pitchFamily="49" charset="0"/>
               </a:rPr>
-              <a:t>= "0899 555 444" },</a:t>
-            </a:r>
+              <a:t>},</a:t>
+            </a:r>
+            <a:endParaRPr lang="en-US" sz="2000" b="1" noProof="1">
+              <a:solidFill>
+                <a:srgbClr val="8CF4F2"/>
+              </a:solidFill>
+              <a:effectLst>
+                <a:outerShdw blurRad="38100" dist="38100" dir="2700000" algn="tl">
+                  <a:srgbClr val="000000">
+                    <a:alpha val="43137"/>
+                  </a:srgbClr>
+                </a:outerShdw>
+              </a:effectLst>
+              <a:latin typeface="Consolas" pitchFamily="49" charset="0"/>
+              <a:cs typeface="Consolas" pitchFamily="49" charset="0"/>
+            </a:endParaRPr>
           </a:p>
           <a:p>
             <a:pPr eaLnBrk="0" hangingPunct="0">
@@ -26043,8 +26400,8 @@
         </p:nvSpPr>
         <p:spPr bwMode="auto">
           <a:xfrm>
-            <a:off x="714152" y="1106299"/>
-            <a:ext cx="7744048" cy="5370701"/>
+            <a:off x="485552" y="1106299"/>
+            <a:ext cx="8201248" cy="5232202"/>
           </a:xfrm>
           <a:prstGeom prst="rect">
             <a:avLst/>
@@ -26072,6 +26429,9 @@
           <a:lstStyle/>
           <a:p>
             <a:pPr eaLnBrk="0" hangingPunct="0">
+              <a:lnSpc>
+                <a:spcPct val="90000"/>
+              </a:lnSpc>
               <a:spcBef>
                 <a:spcPts val="0"/>
               </a:spcBef>
@@ -26084,7 +26444,7 @@
               <a:buSzPct val="70000"/>
             </a:pPr>
             <a:r>
-              <a:rPr lang="en-US" sz="1900" b="1" noProof="1">
+              <a:rPr lang="en-US" sz="2000" b="1" noProof="1">
                 <a:solidFill>
                   <a:srgbClr val="8CF4F2"/>
                 </a:solidFill>
@@ -26101,7 +26461,7 @@
               <a:t>&lt;asp:DetailsView ID="DetailsViewCustomer</a:t>
             </a:r>
             <a:r>
-              <a:rPr lang="en-US" sz="1900" b="1" noProof="1" smtClean="0">
+              <a:rPr lang="en-US" sz="2000" b="1" noProof="1" smtClean="0">
                 <a:solidFill>
                   <a:srgbClr val="8CF4F2"/>
                 </a:solidFill>
@@ -26117,7 +26477,7 @@
               </a:rPr>
               <a:t>"</a:t>
             </a:r>
-            <a:endParaRPr lang="en-US" sz="1900" b="1" noProof="1">
+            <a:endParaRPr lang="en-US" sz="2000" b="1" noProof="1">
               <a:solidFill>
                 <a:srgbClr val="8CF4F2"/>
               </a:solidFill>
@@ -26134,6 +26494,9 @@
           </a:p>
           <a:p>
             <a:pPr eaLnBrk="0" hangingPunct="0">
+              <a:lnSpc>
+                <a:spcPct val="90000"/>
+              </a:lnSpc>
               <a:spcBef>
                 <a:spcPts val="0"/>
               </a:spcBef>
@@ -26146,7 +26509,7 @@
               <a:buSzPct val="70000"/>
             </a:pPr>
             <a:r>
-              <a:rPr lang="en-US" sz="1900" b="1" noProof="1" smtClean="0">
+              <a:rPr lang="en-US" sz="2000" b="1" noProof="1" smtClean="0">
                 <a:solidFill>
                   <a:srgbClr val="8CF4F2"/>
                 </a:solidFill>
@@ -26160,10 +26523,10 @@
                 <a:latin typeface="Consolas" pitchFamily="49" charset="0"/>
                 <a:cs typeface="Consolas" pitchFamily="49" charset="0"/>
               </a:rPr>
-              <a:t>  AutoGenerateRows="True</a:t>
-            </a:r>
-            <a:r>
-              <a:rPr lang="en-US" sz="1900" b="1" noProof="1">
+              <a:t> </a:t>
+            </a:r>
+            <a:r>
+              <a:rPr lang="en-US" sz="2000" b="1" noProof="1" smtClean="0">
                 <a:solidFill>
                   <a:srgbClr val="8CF4F2"/>
                 </a:solidFill>
@@ -26177,11 +26540,48 @@
                 <a:latin typeface="Consolas" pitchFamily="49" charset="0"/>
                 <a:cs typeface="Consolas" pitchFamily="49" charset="0"/>
               </a:rPr>
+              <a:t>AutoGenerateRows</a:t>
+            </a:r>
+            <a:r>
+              <a:rPr lang="en-US" sz="2000" b="1" noProof="1" smtClean="0">
+                <a:solidFill>
+                  <a:srgbClr val="8CF4F2"/>
+                </a:solidFill>
+                <a:effectLst>
+                  <a:outerShdw blurRad="38100" dist="38100" dir="2700000" algn="tl">
+                    <a:srgbClr val="000000">
+                      <a:alpha val="43137"/>
+                    </a:srgbClr>
+                  </a:outerShdw>
+                </a:effectLst>
+                <a:latin typeface="Consolas" pitchFamily="49" charset="0"/>
+                <a:cs typeface="Consolas" pitchFamily="49" charset="0"/>
+              </a:rPr>
+              <a:t>="True</a:t>
+            </a:r>
+            <a:r>
+              <a:rPr lang="en-US" sz="2000" b="1" noProof="1">
+                <a:solidFill>
+                  <a:srgbClr val="8CF4F2"/>
+                </a:solidFill>
+                <a:effectLst>
+                  <a:outerShdw blurRad="38100" dist="38100" dir="2700000" algn="tl">
+                    <a:srgbClr val="000000">
+                      <a:alpha val="43137"/>
+                    </a:srgbClr>
+                  </a:outerShdw>
+                </a:effectLst>
+                <a:latin typeface="Consolas" pitchFamily="49" charset="0"/>
+                <a:cs typeface="Consolas" pitchFamily="49" charset="0"/>
+              </a:rPr>
               <a:t>" AllowPaging="True" </a:t>
             </a:r>
           </a:p>
           <a:p>
             <a:pPr eaLnBrk="0" hangingPunct="0">
+              <a:lnSpc>
+                <a:spcPct val="90000"/>
+              </a:lnSpc>
               <a:spcBef>
                 <a:spcPts val="0"/>
               </a:spcBef>
@@ -26194,7 +26594,7 @@
               <a:buSzPct val="70000"/>
             </a:pPr>
             <a:r>
-              <a:rPr lang="en-US" sz="1900" b="1" noProof="1" smtClean="0">
+              <a:rPr lang="en-US" sz="2000" b="1" noProof="1" smtClean="0">
                 <a:solidFill>
                   <a:srgbClr val="8CF4F2"/>
                 </a:solidFill>
@@ -26208,10 +26608,10 @@
                 <a:latin typeface="Consolas" pitchFamily="49" charset="0"/>
                 <a:cs typeface="Consolas" pitchFamily="49" charset="0"/>
               </a:rPr>
-              <a:t>  </a:t>
-            </a:r>
-            <a:r>
-              <a:rPr lang="en-US" sz="1900" b="1" noProof="1">
+              <a:t> </a:t>
+            </a:r>
+            <a:r>
+              <a:rPr lang="en-US" sz="2000" b="1" noProof="1" smtClean="0">
                 <a:solidFill>
                   <a:srgbClr val="8CF4F2"/>
                 </a:solidFill>
@@ -26225,10 +26625,10 @@
                 <a:latin typeface="Consolas" pitchFamily="49" charset="0"/>
                 <a:cs typeface="Consolas" pitchFamily="49" charset="0"/>
               </a:rPr>
-              <a:t>runat="server" </a:t>
-            </a:r>
-            <a:r>
-              <a:rPr lang="en-US" sz="1900" b="1" noProof="1" smtClean="0">
+              <a:t>runat</a:t>
+            </a:r>
+            <a:r>
+              <a:rPr lang="en-US" sz="2000" b="1" noProof="1">
                 <a:solidFill>
                   <a:srgbClr val="8CF4F2"/>
                 </a:solidFill>
@@ -26242,11 +26642,31 @@
                 <a:latin typeface="Consolas" pitchFamily="49" charset="0"/>
                 <a:cs typeface="Consolas" pitchFamily="49" charset="0"/>
               </a:rPr>
+              <a:t>="server" </a:t>
+            </a:r>
+            <a:r>
+              <a:rPr lang="en-US" sz="2000" b="1" noProof="1" smtClean="0">
+                <a:solidFill>
+                  <a:srgbClr val="8CF4F2"/>
+                </a:solidFill>
+                <a:effectLst>
+                  <a:outerShdw blurRad="38100" dist="38100" dir="2700000" algn="tl">
+                    <a:srgbClr val="000000">
+                      <a:alpha val="43137"/>
+                    </a:srgbClr>
+                  </a:outerShdw>
+                </a:effectLst>
+                <a:latin typeface="Consolas" pitchFamily="49" charset="0"/>
+                <a:cs typeface="Consolas" pitchFamily="49" charset="0"/>
+              </a:rPr>
               <a:t>onpageindexchanging =</a:t>
             </a:r>
           </a:p>
           <a:p>
             <a:pPr eaLnBrk="0" hangingPunct="0">
+              <a:lnSpc>
+                <a:spcPct val="90000"/>
+              </a:lnSpc>
               <a:spcBef>
                 <a:spcPts val="0"/>
               </a:spcBef>
@@ -26259,7 +26679,7 @@
               <a:buSzPct val="70000"/>
             </a:pPr>
             <a:r>
-              <a:rPr lang="en-US" sz="1900" b="1" noProof="1">
+              <a:rPr lang="en-US" sz="2000" b="1" noProof="1">
                 <a:solidFill>
                   <a:srgbClr val="8CF4F2"/>
                 </a:solidFill>
@@ -26276,7 +26696,7 @@
               <a:t> </a:t>
             </a:r>
             <a:r>
-              <a:rPr lang="en-US" sz="1900" b="1" noProof="1" smtClean="0">
+              <a:rPr lang="en-US" sz="2000" b="1" noProof="1" smtClean="0">
                 <a:solidFill>
                   <a:srgbClr val="8CF4F2"/>
                 </a:solidFill>
@@ -26290,10 +26710,10 @@
                 <a:latin typeface="Consolas" pitchFamily="49" charset="0"/>
                 <a:cs typeface="Consolas" pitchFamily="49" charset="0"/>
               </a:rPr>
-              <a:t>   "</a:t>
-            </a:r>
-            <a:r>
-              <a:rPr lang="en-US" sz="1900" b="1" noProof="1">
+              <a:t>"</a:t>
+            </a:r>
+            <a:r>
+              <a:rPr lang="en-US" sz="2000" b="1" noProof="1">
                 <a:solidFill>
                   <a:srgbClr val="8CF4F2"/>
                 </a:solidFill>
@@ -26310,7 +26730,7 @@
               <a:t>DetailsViewCustomer_PageIndexChanging</a:t>
             </a:r>
             <a:r>
-              <a:rPr lang="en-US" sz="1900" b="1" noProof="1" smtClean="0">
+              <a:rPr lang="en-US" sz="2000" b="1" noProof="1" smtClean="0">
                 <a:solidFill>
                   <a:srgbClr val="8CF4F2"/>
                 </a:solidFill>
@@ -26329,6 +26749,9 @@
           </a:p>
           <a:p>
             <a:pPr eaLnBrk="0" hangingPunct="0">
+              <a:lnSpc>
+                <a:spcPct val="90000"/>
+              </a:lnSpc>
               <a:spcBef>
                 <a:spcPts val="0"/>
               </a:spcBef>
@@ -26341,7 +26764,7 @@
               <a:buSzPct val="70000"/>
             </a:pPr>
             <a:r>
-              <a:rPr lang="en-US" sz="1900" b="1" noProof="1" smtClean="0">
+              <a:rPr lang="en-US" sz="2000" b="1" noProof="1" smtClean="0">
                 <a:solidFill>
                   <a:srgbClr val="8CF4F2"/>
                 </a:solidFill>
@@ -26358,7 +26781,7 @@
               <a:t>&lt;/</a:t>
             </a:r>
             <a:r>
-              <a:rPr lang="en-US" sz="1900" b="1" noProof="1">
+              <a:rPr lang="en-US" sz="2000" b="1" noProof="1">
                 <a:solidFill>
                   <a:srgbClr val="8CF4F2"/>
                 </a:solidFill>
@@ -26375,7 +26798,7 @@
               <a:t>asp:DetailsView</a:t>
             </a:r>
             <a:r>
-              <a:rPr lang="en-US" sz="1900" b="1" noProof="1" smtClean="0">
+              <a:rPr lang="en-US" sz="2000" b="1" noProof="1" smtClean="0">
                 <a:solidFill>
                   <a:srgbClr val="8CF4F2"/>
                 </a:solidFill>
@@ -26394,9 +26817,15 @@
           </a:p>
           <a:p>
             <a:pPr eaLnBrk="0" hangingPunct="0">
+              <a:lnSpc>
+                <a:spcPct val="90000"/>
+              </a:lnSpc>
               <a:spcBef>
-                <a:spcPts val="1200"/>
+                <a:spcPts val="600"/>
               </a:spcBef>
+              <a:spcAft>
+                <a:spcPts val="600"/>
+              </a:spcAft>
               <a:buClr>
                 <a:schemeClr val="accent5">
                   <a:lumMod val="40000"/>
@@ -26406,7 +26835,7 @@
               <a:buSzPct val="70000"/>
             </a:pPr>
             <a:r>
-              <a:rPr lang="en-US" sz="1900" b="1" noProof="1" smtClean="0">
+              <a:rPr lang="en-US" sz="2000" b="1" noProof="1" smtClean="0">
                 <a:solidFill>
                   <a:srgbClr val="8CF4F2"/>
                 </a:solidFill>
@@ -26420,28 +26849,14 @@
                 <a:latin typeface="Consolas" pitchFamily="49" charset="0"/>
                 <a:cs typeface="Consolas" pitchFamily="49" charset="0"/>
               </a:rPr>
-              <a:t>protected </a:t>
-            </a:r>
-            <a:r>
-              <a:rPr lang="en-US" sz="1900" b="1" noProof="1">
-                <a:solidFill>
-                  <a:srgbClr val="8CF4F2"/>
-                </a:solidFill>
-                <a:effectLst>
-                  <a:outerShdw blurRad="38100" dist="38100" dir="2700000" algn="tl">
-                    <a:srgbClr val="000000">
-                      <a:alpha val="43137"/>
-                    </a:srgbClr>
-                  </a:outerShdw>
-                </a:effectLst>
-                <a:latin typeface="Consolas" pitchFamily="49" charset="0"/>
-                <a:cs typeface="Consolas" pitchFamily="49" charset="0"/>
-              </a:rPr>
-              <a:t>void Page_Load(object sender, EventArgs e)</a:t>
+              <a:t>. . . </a:t>
             </a:r>
           </a:p>
           <a:p>
             <a:pPr eaLnBrk="0" hangingPunct="0">
+              <a:lnSpc>
+                <a:spcPct val="90000"/>
+              </a:lnSpc>
               <a:spcBef>
                 <a:spcPts val="0"/>
               </a:spcBef>
@@ -26454,7 +26869,7 @@
               <a:buSzPct val="70000"/>
             </a:pPr>
             <a:r>
-              <a:rPr lang="en-US" sz="1900" b="1" noProof="1">
+              <a:rPr lang="en-US" sz="2000" b="1" noProof="1" smtClean="0">
                 <a:solidFill>
                   <a:srgbClr val="8CF4F2"/>
                 </a:solidFill>
@@ -26468,11 +26883,31 @@
                 <a:latin typeface="Consolas" pitchFamily="49" charset="0"/>
                 <a:cs typeface="Consolas" pitchFamily="49" charset="0"/>
               </a:rPr>
-              <a:t>{</a:t>
+              <a:t>protected </a:t>
+            </a:r>
+            <a:r>
+              <a:rPr lang="en-US" sz="2000" b="1" noProof="1">
+                <a:solidFill>
+                  <a:srgbClr val="8CF4F2"/>
+                </a:solidFill>
+                <a:effectLst>
+                  <a:outerShdw blurRad="38100" dist="38100" dir="2700000" algn="tl">
+                    <a:srgbClr val="000000">
+                      <a:alpha val="43137"/>
+                    </a:srgbClr>
+                  </a:outerShdw>
+                </a:effectLst>
+                <a:latin typeface="Consolas" pitchFamily="49" charset="0"/>
+                <a:cs typeface="Consolas" pitchFamily="49" charset="0"/>
+              </a:rPr>
+              <a:t>void Page_Load(object sender, EventArgs e)</a:t>
             </a:r>
           </a:p>
           <a:p>
             <a:pPr eaLnBrk="0" hangingPunct="0">
+              <a:lnSpc>
+                <a:spcPct val="90000"/>
+              </a:lnSpc>
               <a:spcBef>
                 <a:spcPts val="0"/>
               </a:spcBef>
@@ -26485,7 +26920,7 @@
               <a:buSzPct val="70000"/>
             </a:pPr>
             <a:r>
-              <a:rPr lang="en-US" sz="1900" b="1" noProof="1" smtClean="0">
+              <a:rPr lang="en-US" sz="2000" b="1" noProof="1">
                 <a:solidFill>
                   <a:srgbClr val="8CF4F2"/>
                 </a:solidFill>
@@ -26499,28 +26934,14 @@
                 <a:latin typeface="Consolas" pitchFamily="49" charset="0"/>
                 <a:cs typeface="Consolas" pitchFamily="49" charset="0"/>
               </a:rPr>
-              <a:t>  this.DetailsViewCustomer.DataSource </a:t>
-            </a:r>
-            <a:r>
-              <a:rPr lang="en-US" sz="1900" b="1" noProof="1">
-                <a:solidFill>
-                  <a:srgbClr val="8CF4F2"/>
-                </a:solidFill>
-                <a:effectLst>
-                  <a:outerShdw blurRad="38100" dist="38100" dir="2700000" algn="tl">
-                    <a:srgbClr val="000000">
-                      <a:alpha val="43137"/>
-                    </a:srgbClr>
-                  </a:outerShdw>
-                </a:effectLst>
-                <a:latin typeface="Consolas" pitchFamily="49" charset="0"/>
-                <a:cs typeface="Consolas" pitchFamily="49" charset="0"/>
-              </a:rPr>
-              <a:t>= customers;</a:t>
+              <a:t>{</a:t>
             </a:r>
           </a:p>
           <a:p>
             <a:pPr eaLnBrk="0" hangingPunct="0">
+              <a:lnSpc>
+                <a:spcPct val="90000"/>
+              </a:lnSpc>
               <a:spcBef>
                 <a:spcPts val="0"/>
               </a:spcBef>
@@ -26533,7 +26954,7 @@
               <a:buSzPct val="70000"/>
             </a:pPr>
             <a:r>
-              <a:rPr lang="en-US" sz="1900" b="1" noProof="1" smtClean="0">
+              <a:rPr lang="en-US" sz="2000" b="1" noProof="1" smtClean="0">
                 <a:solidFill>
                   <a:srgbClr val="8CF4F2"/>
                 </a:solidFill>
@@ -26550,7 +26971,7 @@
               <a:t>  </a:t>
             </a:r>
             <a:r>
-              <a:rPr lang="en-US" sz="1900" b="1" noProof="1">
+              <a:rPr lang="en-US" sz="2000" b="1" noProof="1" smtClean="0">
                 <a:solidFill>
                   <a:srgbClr val="8CF4F2"/>
                 </a:solidFill>
@@ -26564,11 +26985,31 @@
                 <a:latin typeface="Consolas" pitchFamily="49" charset="0"/>
                 <a:cs typeface="Consolas" pitchFamily="49" charset="0"/>
               </a:rPr>
-              <a:t>this.DetailsViewCustomer.DataBind();</a:t>
+              <a:t> this.DetailsViewCustomer.DataSource </a:t>
+            </a:r>
+            <a:r>
+              <a:rPr lang="en-US" sz="2000" b="1" noProof="1">
+                <a:solidFill>
+                  <a:srgbClr val="8CF4F2"/>
+                </a:solidFill>
+                <a:effectLst>
+                  <a:outerShdw blurRad="38100" dist="38100" dir="2700000" algn="tl">
+                    <a:srgbClr val="000000">
+                      <a:alpha val="43137"/>
+                    </a:srgbClr>
+                  </a:outerShdw>
+                </a:effectLst>
+                <a:latin typeface="Consolas" pitchFamily="49" charset="0"/>
+                <a:cs typeface="Consolas" pitchFamily="49" charset="0"/>
+              </a:rPr>
+              <a:t>= customers;</a:t>
             </a:r>
           </a:p>
           <a:p>
             <a:pPr eaLnBrk="0" hangingPunct="0">
+              <a:lnSpc>
+                <a:spcPct val="90000"/>
+              </a:lnSpc>
               <a:spcBef>
                 <a:spcPts val="0"/>
               </a:spcBef>
@@ -26581,7 +27022,7 @@
               <a:buSzPct val="70000"/>
             </a:pPr>
             <a:r>
-              <a:rPr lang="en-US" sz="1900" b="1" noProof="1" smtClean="0">
+              <a:rPr lang="en-US" sz="2000" b="1" noProof="1" smtClean="0">
                 <a:solidFill>
                   <a:srgbClr val="8CF4F2"/>
                 </a:solidFill>
@@ -26595,59 +27036,48 @@
                 <a:latin typeface="Consolas" pitchFamily="49" charset="0"/>
                 <a:cs typeface="Consolas" pitchFamily="49" charset="0"/>
               </a:rPr>
-              <a:t>}</a:t>
+              <a:t>  </a:t>
+            </a:r>
+            <a:r>
+              <a:rPr lang="en-US" sz="2000" b="1" noProof="1" smtClean="0">
+                <a:solidFill>
+                  <a:srgbClr val="8CF4F2"/>
+                </a:solidFill>
+                <a:effectLst>
+                  <a:outerShdw blurRad="38100" dist="38100" dir="2700000" algn="tl">
+                    <a:srgbClr val="000000">
+                      <a:alpha val="43137"/>
+                    </a:srgbClr>
+                  </a:outerShdw>
+                </a:effectLst>
+                <a:latin typeface="Consolas" pitchFamily="49" charset="0"/>
+                <a:cs typeface="Consolas" pitchFamily="49" charset="0"/>
+              </a:rPr>
+              <a:t> this.DetailsViewCustomer.DataBind</a:t>
+            </a:r>
+            <a:r>
+              <a:rPr lang="en-US" sz="2000" b="1" noProof="1">
+                <a:solidFill>
+                  <a:srgbClr val="8CF4F2"/>
+                </a:solidFill>
+                <a:effectLst>
+                  <a:outerShdw blurRad="38100" dist="38100" dir="2700000" algn="tl">
+                    <a:srgbClr val="000000">
+                      <a:alpha val="43137"/>
+                    </a:srgbClr>
+                  </a:outerShdw>
+                </a:effectLst>
+                <a:latin typeface="Consolas" pitchFamily="49" charset="0"/>
+                <a:cs typeface="Consolas" pitchFamily="49" charset="0"/>
+              </a:rPr>
+              <a:t>();</a:t>
             </a:r>
           </a:p>
           <a:p>
             <a:pPr eaLnBrk="0" hangingPunct="0">
-              <a:spcBef>
-                <a:spcPts val="1200"/>
-              </a:spcBef>
-              <a:buClr>
-                <a:schemeClr val="accent5">
-                  <a:lumMod val="40000"/>
-                  <a:lumOff val="60000"/>
-                </a:schemeClr>
-              </a:buClr>
-              <a:buSzPct val="70000"/>
-            </a:pPr>
-            <a:r>
-              <a:rPr lang="en-US" sz="1900" b="1" noProof="1">
-                <a:solidFill>
-                  <a:srgbClr val="8CF4F2"/>
-                </a:solidFill>
-                <a:effectLst>
-                  <a:outerShdw blurRad="38100" dist="38100" dir="2700000" algn="tl">
-                    <a:srgbClr val="000000">
-                      <a:alpha val="43137"/>
-                    </a:srgbClr>
-                  </a:outerShdw>
-                </a:effectLst>
-                <a:latin typeface="Consolas" pitchFamily="49" charset="0"/>
-                <a:cs typeface="Consolas" pitchFamily="49" charset="0"/>
-              </a:rPr>
-              <a:t>protected void DetailsViewCustomer_PageIndexChanging</a:t>
-            </a:r>
-            <a:r>
-              <a:rPr lang="en-US" sz="1900" b="1" noProof="1" smtClean="0">
-                <a:solidFill>
-                  <a:srgbClr val="8CF4F2"/>
-                </a:solidFill>
-                <a:effectLst>
-                  <a:outerShdw blurRad="38100" dist="38100" dir="2700000" algn="tl">
-                    <a:srgbClr val="000000">
-                      <a:alpha val="43137"/>
-                    </a:srgbClr>
-                  </a:outerShdw>
-                </a:effectLst>
-                <a:latin typeface="Consolas" pitchFamily="49" charset="0"/>
-                <a:cs typeface="Consolas" pitchFamily="49" charset="0"/>
-              </a:rPr>
-              <a:t>(</a:t>
-            </a:r>
-          </a:p>
-          <a:p>
-            <a:pPr eaLnBrk="0" hangingPunct="0">
+              <a:lnSpc>
+                <a:spcPct val="90000"/>
+              </a:lnSpc>
               <a:spcBef>
                 <a:spcPts val="0"/>
               </a:spcBef>
@@ -26660,7 +27090,7 @@
               <a:buSzPct val="70000"/>
             </a:pPr>
             <a:r>
-              <a:rPr lang="en-US" sz="1900" b="1" noProof="1">
+              <a:rPr lang="en-US" sz="2000" b="1" noProof="1" smtClean="0">
                 <a:solidFill>
                   <a:srgbClr val="8CF4F2"/>
                 </a:solidFill>
@@ -26674,79 +27104,14 @@
                 <a:latin typeface="Consolas" pitchFamily="49" charset="0"/>
                 <a:cs typeface="Consolas" pitchFamily="49" charset="0"/>
               </a:rPr>
-              <a:t> </a:t>
-            </a:r>
-            <a:r>
-              <a:rPr lang="en-US" sz="1900" b="1" noProof="1" smtClean="0">
-                <a:solidFill>
-                  <a:srgbClr val="8CF4F2"/>
-                </a:solidFill>
-                <a:effectLst>
-                  <a:outerShdw blurRad="38100" dist="38100" dir="2700000" algn="tl">
-                    <a:srgbClr val="000000">
-                      <a:alpha val="43137"/>
-                    </a:srgbClr>
-                  </a:outerShdw>
-                </a:effectLst>
-                <a:latin typeface="Consolas" pitchFamily="49" charset="0"/>
-                <a:cs typeface="Consolas" pitchFamily="49" charset="0"/>
-              </a:rPr>
-              <a:t> object </a:t>
-            </a:r>
-            <a:r>
-              <a:rPr lang="en-US" sz="1900" b="1" noProof="1">
-                <a:solidFill>
-                  <a:srgbClr val="8CF4F2"/>
-                </a:solidFill>
-                <a:effectLst>
-                  <a:outerShdw blurRad="38100" dist="38100" dir="2700000" algn="tl">
-                    <a:srgbClr val="000000">
-                      <a:alpha val="43137"/>
-                    </a:srgbClr>
-                  </a:outerShdw>
-                </a:effectLst>
-                <a:latin typeface="Consolas" pitchFamily="49" charset="0"/>
-                <a:cs typeface="Consolas" pitchFamily="49" charset="0"/>
-              </a:rPr>
-              <a:t>sender, </a:t>
-            </a:r>
-            <a:r>
-              <a:rPr lang="en-US" sz="1900" b="1" noProof="1" smtClean="0">
-                <a:solidFill>
-                  <a:srgbClr val="8CF4F2"/>
-                </a:solidFill>
-                <a:effectLst>
-                  <a:outerShdw blurRad="38100" dist="38100" dir="2700000" algn="tl">
-                    <a:srgbClr val="000000">
-                      <a:alpha val="43137"/>
-                    </a:srgbClr>
-                  </a:outerShdw>
-                </a:effectLst>
-                <a:latin typeface="Consolas" pitchFamily="49" charset="0"/>
-                <a:cs typeface="Consolas" pitchFamily="49" charset="0"/>
-              </a:rPr>
-              <a:t>DetailsViewPageEventArgs </a:t>
-            </a:r>
-            <a:r>
-              <a:rPr lang="en-US" sz="1900" b="1" noProof="1">
-                <a:solidFill>
-                  <a:srgbClr val="8CF4F2"/>
-                </a:solidFill>
-                <a:effectLst>
-                  <a:outerShdw blurRad="38100" dist="38100" dir="2700000" algn="tl">
-                    <a:srgbClr val="000000">
-                      <a:alpha val="43137"/>
-                    </a:srgbClr>
-                  </a:outerShdw>
-                </a:effectLst>
-                <a:latin typeface="Consolas" pitchFamily="49" charset="0"/>
-                <a:cs typeface="Consolas" pitchFamily="49" charset="0"/>
-              </a:rPr>
-              <a:t>e)</a:t>
+              <a:t>}</a:t>
             </a:r>
           </a:p>
           <a:p>
             <a:pPr eaLnBrk="0" hangingPunct="0">
+              <a:lnSpc>
+                <a:spcPct val="90000"/>
+              </a:lnSpc>
               <a:spcBef>
                 <a:spcPts val="0"/>
               </a:spcBef>
@@ -26759,7 +27124,7 @@
               <a:buSzPct val="70000"/>
             </a:pPr>
             <a:r>
-              <a:rPr lang="en-US" sz="1900" b="1" noProof="1">
+              <a:rPr lang="en-US" sz="2000" b="1" noProof="1">
                 <a:solidFill>
                   <a:srgbClr val="8CF4F2"/>
                 </a:solidFill>
@@ -26773,11 +27138,31 @@
                 <a:latin typeface="Consolas" pitchFamily="49" charset="0"/>
                 <a:cs typeface="Consolas" pitchFamily="49" charset="0"/>
               </a:rPr>
-              <a:t>{</a:t>
+              <a:t>protected void DetailsViewCustomer_PageIndexChanging</a:t>
+            </a:r>
+            <a:r>
+              <a:rPr lang="en-US" sz="2000" b="1" noProof="1" smtClean="0">
+                <a:solidFill>
+                  <a:srgbClr val="8CF4F2"/>
+                </a:solidFill>
+                <a:effectLst>
+                  <a:outerShdw blurRad="38100" dist="38100" dir="2700000" algn="tl">
+                    <a:srgbClr val="000000">
+                      <a:alpha val="43137"/>
+                    </a:srgbClr>
+                  </a:outerShdw>
+                </a:effectLst>
+                <a:latin typeface="Consolas" pitchFamily="49" charset="0"/>
+                <a:cs typeface="Consolas" pitchFamily="49" charset="0"/>
+              </a:rPr>
+              <a:t>(</a:t>
             </a:r>
           </a:p>
           <a:p>
             <a:pPr eaLnBrk="0" hangingPunct="0">
+              <a:lnSpc>
+                <a:spcPct val="90000"/>
+              </a:lnSpc>
               <a:spcBef>
                 <a:spcPts val="0"/>
               </a:spcBef>
@@ -26790,7 +27175,7 @@
               <a:buSzPct val="70000"/>
             </a:pPr>
             <a:r>
-              <a:rPr lang="en-US" sz="1900" b="1" noProof="1" smtClean="0">
+              <a:rPr lang="en-US" sz="2000" b="1" noProof="1">
                 <a:solidFill>
                   <a:srgbClr val="8CF4F2"/>
                 </a:solidFill>
@@ -26804,10 +27189,10 @@
                 <a:latin typeface="Consolas" pitchFamily="49" charset="0"/>
                 <a:cs typeface="Consolas" pitchFamily="49" charset="0"/>
               </a:rPr>
-              <a:t>  </a:t>
-            </a:r>
-            <a:r>
-              <a:rPr lang="en-US" sz="1900" b="1" noProof="1">
+              <a:t> </a:t>
+            </a:r>
+            <a:r>
+              <a:rPr lang="en-US" sz="2000" b="1" noProof="1" smtClean="0">
                 <a:solidFill>
                   <a:srgbClr val="8CF4F2"/>
                 </a:solidFill>
@@ -26821,11 +27206,65 @@
                 <a:latin typeface="Consolas" pitchFamily="49" charset="0"/>
                 <a:cs typeface="Consolas" pitchFamily="49" charset="0"/>
               </a:rPr>
-              <a:t>this.DetailsViewCustomer.PageIndex = e.NewPageIndex;</a:t>
+              <a:t>object </a:t>
+            </a:r>
+            <a:r>
+              <a:rPr lang="en-US" sz="2000" b="1" noProof="1">
+                <a:solidFill>
+                  <a:srgbClr val="8CF4F2"/>
+                </a:solidFill>
+                <a:effectLst>
+                  <a:outerShdw blurRad="38100" dist="38100" dir="2700000" algn="tl">
+                    <a:srgbClr val="000000">
+                      <a:alpha val="43137"/>
+                    </a:srgbClr>
+                  </a:outerShdw>
+                </a:effectLst>
+                <a:latin typeface="Consolas" pitchFamily="49" charset="0"/>
+                <a:cs typeface="Consolas" pitchFamily="49" charset="0"/>
+              </a:rPr>
+              <a:t>sender, </a:t>
+            </a:r>
+            <a:r>
+              <a:rPr lang="en-US" sz="2000" b="1" noProof="1" smtClean="0">
+                <a:solidFill>
+                  <a:srgbClr val="8CF4F2"/>
+                </a:solidFill>
+                <a:effectLst>
+                  <a:outerShdw blurRad="38100" dist="38100" dir="2700000" algn="tl">
+                    <a:srgbClr val="000000">
+                      <a:alpha val="43137"/>
+                    </a:srgbClr>
+                  </a:outerShdw>
+                </a:effectLst>
+                <a:latin typeface="Consolas" pitchFamily="49" charset="0"/>
+                <a:cs typeface="Consolas" pitchFamily="49" charset="0"/>
+              </a:rPr>
+              <a:t>DetailsViewPageEventArgs </a:t>
+            </a:r>
+            <a:r>
+              <a:rPr lang="en-US" sz="2000" b="1" noProof="1">
+                <a:solidFill>
+                  <a:srgbClr val="8CF4F2"/>
+                </a:solidFill>
+                <a:effectLst>
+                  <a:outerShdw blurRad="38100" dist="38100" dir="2700000" algn="tl">
+                    <a:srgbClr val="000000">
+                      <a:alpha val="43137"/>
+                    </a:srgbClr>
+                  </a:outerShdw>
+                </a:effectLst>
+                <a:latin typeface="Consolas" pitchFamily="49" charset="0"/>
+                <a:cs typeface="Consolas" pitchFamily="49" charset="0"/>
+              </a:rPr>
+              <a:t>e)</a:t>
             </a:r>
           </a:p>
           <a:p>
             <a:pPr eaLnBrk="0" hangingPunct="0">
+              <a:lnSpc>
+                <a:spcPct val="90000"/>
+              </a:lnSpc>
               <a:spcBef>
                 <a:spcPts val="0"/>
               </a:spcBef>
@@ -26838,7 +27277,7 @@
               <a:buSzPct val="70000"/>
             </a:pPr>
             <a:r>
-              <a:rPr lang="en-US" sz="1900" b="1" noProof="1" smtClean="0">
+              <a:rPr lang="en-US" sz="2000" b="1" noProof="1">
                 <a:solidFill>
                   <a:srgbClr val="8CF4F2"/>
                 </a:solidFill>
@@ -26852,62 +27291,14 @@
                 <a:latin typeface="Consolas" pitchFamily="49" charset="0"/>
                 <a:cs typeface="Consolas" pitchFamily="49" charset="0"/>
               </a:rPr>
-              <a:t>  </a:t>
-            </a:r>
-            <a:r>
-              <a:rPr lang="en-US" sz="1900" b="1" noProof="1">
-                <a:solidFill>
-                  <a:srgbClr val="8CF4F2"/>
-                </a:solidFill>
-                <a:effectLst>
-                  <a:outerShdw blurRad="38100" dist="38100" dir="2700000" algn="tl">
-                    <a:srgbClr val="000000">
-                      <a:alpha val="43137"/>
-                    </a:srgbClr>
-                  </a:outerShdw>
-                </a:effectLst>
-                <a:latin typeface="Consolas" pitchFamily="49" charset="0"/>
-                <a:cs typeface="Consolas" pitchFamily="49" charset="0"/>
-              </a:rPr>
-              <a:t>this.DetailsViewCustomer.DataSource = </a:t>
-            </a:r>
-            <a:r>
-              <a:rPr lang="en-US" sz="1900" b="1" noProof="1" smtClean="0">
-                <a:solidFill>
-                  <a:srgbClr val="8CF4F2"/>
-                </a:solidFill>
-                <a:effectLst>
-                  <a:outerShdw blurRad="38100" dist="38100" dir="2700000" algn="tl">
-                    <a:srgbClr val="000000">
-                      <a:alpha val="43137"/>
-                    </a:srgbClr>
-                  </a:outerShdw>
-                </a:effectLst>
-                <a:latin typeface="Consolas" pitchFamily="49" charset="0"/>
-                <a:cs typeface="Consolas" pitchFamily="49" charset="0"/>
-              </a:rPr>
-              <a:t>customers</a:t>
-            </a:r>
-            <a:r>
-              <a:rPr lang="en-US" sz="1900" b="1" noProof="1">
-                <a:solidFill>
-                  <a:srgbClr val="8CF4F2"/>
-                </a:solidFill>
-                <a:effectLst>
-                  <a:outerShdw blurRad="38100" dist="38100" dir="2700000" algn="tl">
-                    <a:srgbClr val="000000">
-                      <a:alpha val="43137"/>
-                    </a:srgbClr>
-                  </a:outerShdw>
-                </a:effectLst>
-                <a:latin typeface="Consolas" pitchFamily="49" charset="0"/>
-                <a:cs typeface="Consolas" pitchFamily="49" charset="0"/>
-              </a:rPr>
-              <a:t>;</a:t>
+              <a:t>{</a:t>
             </a:r>
           </a:p>
           <a:p>
             <a:pPr eaLnBrk="0" hangingPunct="0">
+              <a:lnSpc>
+                <a:spcPct val="90000"/>
+              </a:lnSpc>
               <a:spcBef>
                 <a:spcPts val="0"/>
               </a:spcBef>
@@ -26920,7 +27311,7 @@
               <a:buSzPct val="70000"/>
             </a:pPr>
             <a:r>
-              <a:rPr lang="en-US" sz="1900" b="1" noProof="1" smtClean="0">
+              <a:rPr lang="en-US" sz="2000" b="1" noProof="1" smtClean="0">
                 <a:solidFill>
                   <a:srgbClr val="8CF4F2"/>
                 </a:solidFill>
@@ -26934,10 +27325,27 @@
                 <a:latin typeface="Consolas" pitchFamily="49" charset="0"/>
                 <a:cs typeface="Consolas" pitchFamily="49" charset="0"/>
               </a:rPr>
+              <a:t> </a:t>
+            </a:r>
+            <a:r>
+              <a:rPr lang="en-US" sz="2000" b="1" noProof="1" smtClean="0">
+                <a:solidFill>
+                  <a:srgbClr val="8CF4F2"/>
+                </a:solidFill>
+                <a:effectLst>
+                  <a:outerShdw blurRad="38100" dist="38100" dir="2700000" algn="tl">
+                    <a:srgbClr val="000000">
+                      <a:alpha val="43137"/>
+                    </a:srgbClr>
+                  </a:outerShdw>
+                </a:effectLst>
+                <a:latin typeface="Consolas" pitchFamily="49" charset="0"/>
+                <a:cs typeface="Consolas" pitchFamily="49" charset="0"/>
+              </a:rPr>
               <a:t>  </a:t>
             </a:r>
             <a:r>
-              <a:rPr lang="en-US" sz="1900" b="1" noProof="1">
+              <a:rPr lang="en-US" sz="2000" b="1" noProof="1">
                 <a:solidFill>
                   <a:srgbClr val="8CF4F2"/>
                 </a:solidFill>
@@ -26951,11 +27359,14 @@
                 <a:latin typeface="Consolas" pitchFamily="49" charset="0"/>
                 <a:cs typeface="Consolas" pitchFamily="49" charset="0"/>
               </a:rPr>
-              <a:t>this.DetailsViewCustomer.DataBind();</a:t>
+              <a:t>this.DetailsViewCustomer.PageIndex = e.NewPageIndex;</a:t>
             </a:r>
           </a:p>
           <a:p>
             <a:pPr eaLnBrk="0" hangingPunct="0">
+              <a:lnSpc>
+                <a:spcPct val="90000"/>
+              </a:lnSpc>
               <a:spcBef>
                 <a:spcPts val="0"/>
               </a:spcBef>
@@ -26968,7 +27379,177 @@
               <a:buSzPct val="70000"/>
             </a:pPr>
             <a:r>
-              <a:rPr lang="en-US" sz="1900" b="1" noProof="1">
+              <a:rPr lang="en-US" sz="2000" b="1" noProof="1" smtClean="0">
+                <a:solidFill>
+                  <a:srgbClr val="8CF4F2"/>
+                </a:solidFill>
+                <a:effectLst>
+                  <a:outerShdw blurRad="38100" dist="38100" dir="2700000" algn="tl">
+                    <a:srgbClr val="000000">
+                      <a:alpha val="43137"/>
+                    </a:srgbClr>
+                  </a:outerShdw>
+                </a:effectLst>
+                <a:latin typeface="Consolas" pitchFamily="49" charset="0"/>
+                <a:cs typeface="Consolas" pitchFamily="49" charset="0"/>
+              </a:rPr>
+              <a:t> </a:t>
+            </a:r>
+            <a:r>
+              <a:rPr lang="en-US" sz="2000" b="1" noProof="1" smtClean="0">
+                <a:solidFill>
+                  <a:srgbClr val="8CF4F2"/>
+                </a:solidFill>
+                <a:effectLst>
+                  <a:outerShdw blurRad="38100" dist="38100" dir="2700000" algn="tl">
+                    <a:srgbClr val="000000">
+                      <a:alpha val="43137"/>
+                    </a:srgbClr>
+                  </a:outerShdw>
+                </a:effectLst>
+                <a:latin typeface="Consolas" pitchFamily="49" charset="0"/>
+                <a:cs typeface="Consolas" pitchFamily="49" charset="0"/>
+              </a:rPr>
+              <a:t>  </a:t>
+            </a:r>
+            <a:r>
+              <a:rPr lang="en-US" sz="2000" b="1" noProof="1">
+                <a:solidFill>
+                  <a:srgbClr val="8CF4F2"/>
+                </a:solidFill>
+                <a:effectLst>
+                  <a:outerShdw blurRad="38100" dist="38100" dir="2700000" algn="tl">
+                    <a:srgbClr val="000000">
+                      <a:alpha val="43137"/>
+                    </a:srgbClr>
+                  </a:outerShdw>
+                </a:effectLst>
+                <a:latin typeface="Consolas" pitchFamily="49" charset="0"/>
+                <a:cs typeface="Consolas" pitchFamily="49" charset="0"/>
+              </a:rPr>
+              <a:t>this.DetailsViewCustomer.DataSource = </a:t>
+            </a:r>
+            <a:r>
+              <a:rPr lang="en-US" sz="2000" b="1" noProof="1" smtClean="0">
+                <a:solidFill>
+                  <a:srgbClr val="8CF4F2"/>
+                </a:solidFill>
+                <a:effectLst>
+                  <a:outerShdw blurRad="38100" dist="38100" dir="2700000" algn="tl">
+                    <a:srgbClr val="000000">
+                      <a:alpha val="43137"/>
+                    </a:srgbClr>
+                  </a:outerShdw>
+                </a:effectLst>
+                <a:latin typeface="Consolas" pitchFamily="49" charset="0"/>
+                <a:cs typeface="Consolas" pitchFamily="49" charset="0"/>
+              </a:rPr>
+              <a:t>customers</a:t>
+            </a:r>
+            <a:r>
+              <a:rPr lang="en-US" sz="2000" b="1" noProof="1">
+                <a:solidFill>
+                  <a:srgbClr val="8CF4F2"/>
+                </a:solidFill>
+                <a:effectLst>
+                  <a:outerShdw blurRad="38100" dist="38100" dir="2700000" algn="tl">
+                    <a:srgbClr val="000000">
+                      <a:alpha val="43137"/>
+                    </a:srgbClr>
+                  </a:outerShdw>
+                </a:effectLst>
+                <a:latin typeface="Consolas" pitchFamily="49" charset="0"/>
+                <a:cs typeface="Consolas" pitchFamily="49" charset="0"/>
+              </a:rPr>
+              <a:t>;</a:t>
+            </a:r>
+          </a:p>
+          <a:p>
+            <a:pPr eaLnBrk="0" hangingPunct="0">
+              <a:lnSpc>
+                <a:spcPct val="90000"/>
+              </a:lnSpc>
+              <a:spcBef>
+                <a:spcPts val="0"/>
+              </a:spcBef>
+              <a:buClr>
+                <a:schemeClr val="accent5">
+                  <a:lumMod val="40000"/>
+                  <a:lumOff val="60000"/>
+                </a:schemeClr>
+              </a:buClr>
+              <a:buSzPct val="70000"/>
+            </a:pPr>
+            <a:r>
+              <a:rPr lang="en-US" sz="2000" b="1" noProof="1" smtClean="0">
+                <a:solidFill>
+                  <a:srgbClr val="8CF4F2"/>
+                </a:solidFill>
+                <a:effectLst>
+                  <a:outerShdw blurRad="38100" dist="38100" dir="2700000" algn="tl">
+                    <a:srgbClr val="000000">
+                      <a:alpha val="43137"/>
+                    </a:srgbClr>
+                  </a:outerShdw>
+                </a:effectLst>
+                <a:latin typeface="Consolas" pitchFamily="49" charset="0"/>
+                <a:cs typeface="Consolas" pitchFamily="49" charset="0"/>
+              </a:rPr>
+              <a:t>  </a:t>
+            </a:r>
+            <a:r>
+              <a:rPr lang="en-US" sz="2000" b="1" noProof="1" smtClean="0">
+                <a:solidFill>
+                  <a:srgbClr val="8CF4F2"/>
+                </a:solidFill>
+                <a:effectLst>
+                  <a:outerShdw blurRad="38100" dist="38100" dir="2700000" algn="tl">
+                    <a:srgbClr val="000000">
+                      <a:alpha val="43137"/>
+                    </a:srgbClr>
+                  </a:outerShdw>
+                </a:effectLst>
+                <a:latin typeface="Consolas" pitchFamily="49" charset="0"/>
+                <a:cs typeface="Consolas" pitchFamily="49" charset="0"/>
+              </a:rPr>
+              <a:t> this.DetailsViewCustomer.DataBind</a:t>
+            </a:r>
+            <a:r>
+              <a:rPr lang="en-US" sz="2000" b="1" noProof="1">
+                <a:solidFill>
+                  <a:srgbClr val="8CF4F2"/>
+                </a:solidFill>
+                <a:effectLst>
+                  <a:outerShdw blurRad="38100" dist="38100" dir="2700000" algn="tl">
+                    <a:srgbClr val="000000">
+                      <a:alpha val="43137"/>
+                    </a:srgbClr>
+                  </a:outerShdw>
+                </a:effectLst>
+                <a:latin typeface="Consolas" pitchFamily="49" charset="0"/>
+                <a:cs typeface="Consolas" pitchFamily="49" charset="0"/>
+              </a:rPr>
+              <a:t>();</a:t>
+            </a:r>
+          </a:p>
+          <a:p>
+            <a:pPr eaLnBrk="0" hangingPunct="0">
+              <a:lnSpc>
+                <a:spcPct val="90000"/>
+              </a:lnSpc>
+              <a:spcBef>
+                <a:spcPts val="0"/>
+              </a:spcBef>
+              <a:buClr>
+                <a:schemeClr val="accent5">
+                  <a:lumMod val="40000"/>
+                  <a:lumOff val="60000"/>
+                </a:schemeClr>
+              </a:buClr>
+              <a:buSzPct val="70000"/>
+            </a:pPr>
+            <a:r>
+              <a:rPr lang="en-US" sz="2000" b="1" noProof="1">
                 <a:solidFill>
                   <a:srgbClr val="8CF4F2"/>
                 </a:solidFill>
@@ -27178,15 +27759,37 @@
               </a:lnSpc>
             </a:pPr>
             <a:r>
+              <a:rPr lang="en-US" dirty="0" smtClean="0">
+                <a:solidFill>
+                  <a:schemeClr val="accent5">
+                    <a:lumMod val="20000"/>
+                    <a:lumOff val="80000"/>
+                  </a:schemeClr>
+                </a:solidFill>
+                <a:latin typeface="+mj-lt"/>
+                <a:cs typeface="Consolas" pitchFamily="49" charset="0"/>
+              </a:rPr>
+              <a:t>Templated</a:t>
+            </a:r>
+            <a:r>
               <a:rPr lang="en-US" dirty="0" smtClean="0"/>
-              <a:t>Templated version of</a:t>
+              <a:t> version of</a:t>
             </a:r>
             <a:r>
               <a:rPr lang="bg-BG" dirty="0" smtClean="0"/>
               <a:t> </a:t>
             </a:r>
             <a:r>
-              <a:rPr lang="en-US" dirty="0" smtClean="0"/>
+              <a:rPr lang="en-US" dirty="0" smtClean="0">
+                <a:solidFill>
+                  <a:schemeClr val="accent5">
+                    <a:lumMod val="20000"/>
+                    <a:lumOff val="80000"/>
+                  </a:schemeClr>
+                </a:solidFill>
+                <a:latin typeface="Consolas" pitchFamily="49" charset="0"/>
+                <a:cs typeface="Consolas" pitchFamily="49" charset="0"/>
+              </a:rPr>
               <a:t>DetailsView</a:t>
             </a:r>
           </a:p>
@@ -27250,15 +27853,22 @@
             </a:pPr>
             <a:r>
               <a:rPr lang="en-US" dirty="0" smtClean="0"/>
-              <a:t>You can use many controls for the templates</a:t>
-            </a:r>
-            <a:r>
-              <a:rPr lang="bg-BG" dirty="0" smtClean="0"/>
+              <a:t>You can use many controls for the </a:t>
+            </a:r>
+            <a:r>
+              <a:rPr lang="en-US" dirty="0" smtClean="0"/>
+              <a:t>templates</a:t>
+            </a:r>
+          </a:p>
+          <a:p>
+            <a:pPr lvl="2">
+              <a:lnSpc>
+                <a:spcPct val="110000"/>
+              </a:lnSpc>
+            </a:pPr>
+            <a:r>
+              <a:rPr lang="en-US" dirty="0" smtClean="0"/>
               <a:t> </a:t>
-            </a:r>
-            <a:r>
-              <a:rPr lang="en-US" dirty="0" smtClean="0"/>
-              <a:t>- </a:t>
             </a:r>
             <a:r>
               <a:rPr lang="en-US" dirty="0" smtClean="0">
@@ -27496,7 +28106,15 @@
             </a:r>
             <a:r>
               <a:rPr lang="en-US" noProof="1" smtClean="0"/>
-              <a:t> method to accomplish a read-only binding</a:t>
+              <a:t> method to accomplish a </a:t>
+            </a:r>
+            <a:r>
+              <a:rPr lang="en-US" noProof="1" smtClean="0"/>
+              <a:t>   read-only </a:t>
+            </a:r>
+            <a:r>
+              <a:rPr lang="en-US" noProof="1" smtClean="0"/>
+              <a:t>binding</a:t>
             </a:r>
           </a:p>
           <a:p>
@@ -27658,7 +28276,7 @@
         <p:spPr bwMode="auto">
           <a:xfrm>
             <a:off x="609600" y="1198941"/>
-            <a:ext cx="7924800" cy="5049459"/>
+            <a:ext cx="7924800" cy="5222968"/>
           </a:xfrm>
           <a:prstGeom prst="rect">
             <a:avLst/>
@@ -27766,7 +28384,24 @@
                 <a:latin typeface="Consolas" pitchFamily="49" charset="0"/>
                 <a:cs typeface="Consolas" pitchFamily="49" charset="0"/>
               </a:rPr>
-              <a:t>  AllowPaging</a:t>
+              <a:t> </a:t>
+            </a:r>
+            <a:r>
+              <a:rPr lang="en-US" sz="2100" b="1" noProof="1" smtClean="0">
+                <a:solidFill>
+                  <a:srgbClr val="8CF4F2"/>
+                </a:solidFill>
+                <a:effectLst>
+                  <a:outerShdw blurRad="38100" dist="38100" dir="2700000" algn="tl">
+                    <a:srgbClr val="000000">
+                      <a:alpha val="43137"/>
+                    </a:srgbClr>
+                  </a:outerShdw>
+                </a:effectLst>
+                <a:latin typeface="Consolas" pitchFamily="49" charset="0"/>
+                <a:cs typeface="Consolas" pitchFamily="49" charset="0"/>
+              </a:rPr>
+              <a:t>AllowPaging</a:t>
             </a:r>
             <a:r>
               <a:rPr lang="en-US" sz="2100" b="1" noProof="1">
@@ -27800,7 +28435,24 @@
                 <a:latin typeface="Consolas" pitchFamily="49" charset="0"/>
                 <a:cs typeface="Consolas" pitchFamily="49" charset="0"/>
               </a:rPr>
-              <a:t>" onpageindexchanging=</a:t>
+              <a:t>" </a:t>
+            </a:r>
+            <a:r>
+              <a:rPr lang="en-US" sz="2100" b="1" noProof="1" smtClean="0">
+                <a:solidFill>
+                  <a:srgbClr val="8CF4F2"/>
+                </a:solidFill>
+                <a:effectLst>
+                  <a:outerShdw blurRad="38100" dist="38100" dir="2700000" algn="tl">
+                    <a:srgbClr val="000000">
+                      <a:alpha val="43137"/>
+                    </a:srgbClr>
+                  </a:outerShdw>
+                </a:effectLst>
+                <a:latin typeface="Consolas" pitchFamily="49" charset="0"/>
+                <a:cs typeface="Consolas" pitchFamily="49" charset="0"/>
+              </a:rPr>
+              <a:t>onpageindexchanging=</a:t>
             </a:r>
           </a:p>
           <a:p>
@@ -27820,7 +28472,7 @@
               <a:buSzPct val="70000"/>
             </a:pPr>
             <a:r>
-              <a:rPr lang="en-US" sz="2100" b="1" noProof="1">
+              <a:rPr lang="en-US" sz="2100" b="1" noProof="1" smtClean="0">
                 <a:solidFill>
                   <a:srgbClr val="8CF4F2"/>
                 </a:solidFill>
@@ -27834,41 +28486,7 @@
                 <a:latin typeface="Consolas" pitchFamily="49" charset="0"/>
                 <a:cs typeface="Consolas" pitchFamily="49" charset="0"/>
               </a:rPr>
-              <a:t> </a:t>
-            </a:r>
-            <a:r>
-              <a:rPr lang="en-US" sz="2100" b="1" noProof="1" smtClean="0">
-                <a:solidFill>
-                  <a:srgbClr val="8CF4F2"/>
-                </a:solidFill>
-                <a:effectLst>
-                  <a:outerShdw blurRad="38100" dist="38100" dir="2700000" algn="tl">
-                    <a:srgbClr val="000000">
-                      <a:alpha val="43137"/>
-                    </a:srgbClr>
-                  </a:outerShdw>
-                </a:effectLst>
-                <a:latin typeface="Consolas" pitchFamily="49" charset="0"/>
-                <a:cs typeface="Consolas" pitchFamily="49" charset="0"/>
-              </a:rPr>
-              <a:t> "</a:t>
-            </a:r>
-            <a:r>
-              <a:rPr lang="en-US" sz="2100" b="1" noProof="1">
-                <a:solidFill>
-                  <a:srgbClr val="8CF4F2"/>
-                </a:solidFill>
-                <a:effectLst>
-                  <a:outerShdw blurRad="38100" dist="38100" dir="2700000" algn="tl">
-                    <a:srgbClr val="000000">
-                      <a:alpha val="43137"/>
-                    </a:srgbClr>
-                  </a:outerShdw>
-                </a:effectLst>
-                <a:latin typeface="Consolas" pitchFamily="49" charset="0"/>
-                <a:cs typeface="Consolas" pitchFamily="49" charset="0"/>
-              </a:rPr>
-              <a:t>FormViewCustomer_PageIndexChanging"&gt;</a:t>
+              <a:t> "FormViewCustomer_PageIndexChanging"&gt;</a:t>
             </a:r>
           </a:p>
           <a:p>
@@ -27902,7 +28520,58 @@
                 <a:latin typeface="Consolas" pitchFamily="49" charset="0"/>
                 <a:cs typeface="Consolas" pitchFamily="49" charset="0"/>
               </a:rPr>
-              <a:t>  &lt;ItemTemplate&gt;</a:t>
+              <a:t> </a:t>
+            </a:r>
+            <a:r>
+              <a:rPr lang="en-US" sz="2100" b="1" noProof="1" smtClean="0">
+                <a:solidFill>
+                  <a:srgbClr val="8CF4F2"/>
+                </a:solidFill>
+                <a:effectLst>
+                  <a:outerShdw blurRad="38100" dist="38100" dir="2700000" algn="tl">
+                    <a:srgbClr val="000000">
+                      <a:alpha val="43137"/>
+                    </a:srgbClr>
+                  </a:outerShdw>
+                </a:effectLst>
+                <a:latin typeface="Consolas" pitchFamily="49" charset="0"/>
+                <a:cs typeface="Consolas" pitchFamily="49" charset="0"/>
+              </a:rPr>
+              <a:t> </a:t>
+            </a:r>
+            <a:r>
+              <a:rPr lang="en-US" sz="2100" b="1" noProof="1" smtClean="0">
+                <a:solidFill>
+                  <a:srgbClr val="8CF4F2"/>
+                </a:solidFill>
+                <a:effectLst>
+                  <a:outerShdw blurRad="38100" dist="38100" dir="2700000" algn="tl">
+                    <a:srgbClr val="000000">
+                      <a:alpha val="43137"/>
+                    </a:srgbClr>
+                  </a:outerShdw>
+                </a:effectLst>
+                <a:latin typeface="Consolas" pitchFamily="49" charset="0"/>
+                <a:cs typeface="Consolas" pitchFamily="49" charset="0"/>
+              </a:rPr>
+              <a:t>&lt;</a:t>
+            </a:r>
+            <a:r>
+              <a:rPr lang="en-US" sz="2100" b="1" noProof="1">
+                <a:solidFill>
+                  <a:srgbClr val="8CF4F2"/>
+                </a:solidFill>
+                <a:effectLst>
+                  <a:outerShdw blurRad="38100" dist="38100" dir="2700000" algn="tl">
+                    <a:srgbClr val="000000">
+                      <a:alpha val="43137"/>
+                    </a:srgbClr>
+                  </a:outerShdw>
+                </a:effectLst>
+                <a:latin typeface="Consolas" pitchFamily="49" charset="0"/>
+                <a:cs typeface="Consolas" pitchFamily="49" charset="0"/>
+              </a:rPr>
+              <a:t>ItemTemplate&gt;</a:t>
             </a:r>
           </a:p>
           <a:p>
@@ -28021,7 +28690,24 @@
                 <a:latin typeface="Consolas" pitchFamily="49" charset="0"/>
                 <a:cs typeface="Consolas" pitchFamily="49" charset="0"/>
               </a:rPr>
-              <a:t>      Eval</a:t>
+              <a:t>     </a:t>
+            </a:r>
+            <a:r>
+              <a:rPr lang="en-US" sz="2100" b="1" noProof="1" smtClean="0">
+                <a:solidFill>
+                  <a:srgbClr val="8CF4F2"/>
+                </a:solidFill>
+                <a:effectLst>
+                  <a:outerShdw blurRad="38100" dist="38100" dir="2700000" algn="tl">
+                    <a:srgbClr val="000000">
+                      <a:alpha val="43137"/>
+                    </a:srgbClr>
+                  </a:outerShdw>
+                </a:effectLst>
+                <a:latin typeface="Consolas" pitchFamily="49" charset="0"/>
+                <a:cs typeface="Consolas" pitchFamily="49" charset="0"/>
+              </a:rPr>
+              <a:t>Eval</a:t>
             </a:r>
             <a:r>
               <a:rPr lang="en-US" sz="2100" b="1" noProof="1">
@@ -28166,8 +28852,11 @@
                 <a:spcPct val="110000"/>
               </a:lnSpc>
               <a:spcBef>
-                <a:spcPts val="0"/>
+                <a:spcPts val="600"/>
               </a:spcBef>
+              <a:spcAft>
+                <a:spcPts val="600"/>
+              </a:spcAft>
               <a:buClr>
                 <a:schemeClr val="accent5">
                   <a:lumMod val="40000"/>
@@ -28191,7 +28880,7 @@
                 <a:latin typeface="Consolas" pitchFamily="49" charset="0"/>
                 <a:cs typeface="Consolas" pitchFamily="49" charset="0"/>
               </a:rPr>
-              <a:t>…</a:t>
+              <a:t>. . .</a:t>
             </a:r>
             <a:endParaRPr lang="en-US" sz="2100" b="1" noProof="1">
               <a:solidFill>
@@ -28307,6 +28996,23 @@
                 <a:latin typeface="Consolas" pitchFamily="49" charset="0"/>
                 <a:cs typeface="Consolas" pitchFamily="49" charset="0"/>
               </a:rPr>
+              <a:t> </a:t>
+            </a:r>
+            <a:r>
+              <a:rPr lang="en-US" sz="2100" b="1" noProof="1" smtClean="0">
+                <a:solidFill>
+                  <a:srgbClr val="8CF4F2"/>
+                </a:solidFill>
+                <a:effectLst>
+                  <a:outerShdw blurRad="38100" dist="38100" dir="2700000" algn="tl">
+                    <a:srgbClr val="000000">
+                      <a:alpha val="43137"/>
+                    </a:srgbClr>
+                  </a:outerShdw>
+                </a:effectLst>
+                <a:latin typeface="Consolas" pitchFamily="49" charset="0"/>
+                <a:cs typeface="Consolas" pitchFamily="49" charset="0"/>
+              </a:rPr>
               <a:t>  </a:t>
             </a:r>
             <a:r>
@@ -28361,6 +29067,23 @@
               <a:t>  </a:t>
             </a:r>
             <a:r>
+              <a:rPr lang="en-US" sz="2100" b="1" noProof="1" smtClean="0">
+                <a:solidFill>
+                  <a:srgbClr val="8CF4F2"/>
+                </a:solidFill>
+                <a:effectLst>
+                  <a:outerShdw blurRad="38100" dist="38100" dir="2700000" algn="tl">
+                    <a:srgbClr val="000000">
+                      <a:alpha val="43137"/>
+                    </a:srgbClr>
+                  </a:outerShdw>
+                </a:effectLst>
+                <a:latin typeface="Consolas" pitchFamily="49" charset="0"/>
+                <a:cs typeface="Consolas" pitchFamily="49" charset="0"/>
+              </a:rPr>
+              <a:t> this.FormViewCustomer.DataBind</a:t>
+            </a:r>
+            <a:r>
               <a:rPr lang="en-US" sz="2100" b="1" noProof="1">
                 <a:solidFill>
                   <a:srgbClr val="8CF4F2"/>
@@ -28375,7 +29098,7 @@
                 <a:latin typeface="Consolas" pitchFamily="49" charset="0"/>
                 <a:cs typeface="Consolas" pitchFamily="49" charset="0"/>
               </a:rPr>
-              <a:t>this.FormViewCustomer.DataBind();</a:t>
+              <a:t>();</a:t>
             </a:r>
           </a:p>
           <a:p>
@@ -28488,7 +29211,7 @@
           <a:p>
             <a:pPr>
               <a:lnSpc>
-                <a:spcPct val="110000"/>
+                <a:spcPct val="100000"/>
               </a:lnSpc>
             </a:pPr>
             <a:r>
@@ -28522,7 +29245,7 @@
           <a:p>
             <a:pPr lvl="1">
               <a:lnSpc>
-                <a:spcPct val="110000"/>
+                <a:spcPct val="100000"/>
               </a:lnSpc>
             </a:pPr>
             <a:r>
@@ -28541,7 +29264,7 @@
           <a:p>
             <a:pPr lvl="2">
               <a:lnSpc>
-                <a:spcPct val="110000"/>
+                <a:spcPct val="100000"/>
               </a:lnSpc>
             </a:pPr>
             <a:r>
@@ -28568,7 +29291,7 @@
           <a:p>
             <a:pPr lvl="2">
               <a:lnSpc>
-                <a:spcPct val="110000"/>
+                <a:spcPct val="100000"/>
               </a:lnSpc>
             </a:pPr>
             <a:r>
@@ -28591,7 +29314,7 @@
           <a:p>
             <a:pPr lvl="1">
               <a:lnSpc>
-                <a:spcPct val="110000"/>
+                <a:spcPct val="100000"/>
               </a:lnSpc>
             </a:pPr>
             <a:r>
@@ -28665,7 +29388,7 @@
           <a:p>
             <a:pPr lvl="1">
               <a:lnSpc>
-                <a:spcPct val="110000"/>
+                <a:spcPct val="100000"/>
               </a:lnSpc>
             </a:pPr>
             <a:r>
@@ -28900,6 +29623,10 @@
           </p:nvPr>
         </p:nvSpPr>
         <p:spPr>
+          <a:xfrm>
+            <a:off x="228600" y="914400"/>
+            <a:ext cx="8686800" cy="5638800"/>
+          </a:xfrm>
           <a:prstGeom prst="rect">
             <a:avLst/>
           </a:prstGeom>
@@ -29452,8 +30179,10 @@
             <a:off x="5718175" y="4665257"/>
             <a:ext cx="2786063" cy="1800225"/>
           </a:xfrm>
-          <a:prstGeom prst="rect">
-            <a:avLst/>
+          <a:prstGeom prst="roundRect">
+            <a:avLst>
+              <a:gd name="adj" fmla="val 7798"/>
+            </a:avLst>
           </a:prstGeom>
           <a:noFill/>
         </p:spPr>
@@ -29478,8 +30207,10 @@
             <a:off x="685800" y="1066800"/>
             <a:ext cx="1819275" cy="885825"/>
           </a:xfrm>
-          <a:prstGeom prst="rect">
-            <a:avLst/>
+          <a:prstGeom prst="roundRect">
+            <a:avLst>
+              <a:gd name="adj" fmla="val 8474"/>
+            </a:avLst>
           </a:prstGeom>
           <a:noFill/>
           <a:ln w="9525">
@@ -29510,8 +30241,10 @@
             <a:off x="3203575" y="1104901"/>
             <a:ext cx="3581400" cy="809625"/>
           </a:xfrm>
-          <a:prstGeom prst="rect">
-            <a:avLst/>
+          <a:prstGeom prst="roundRect">
+            <a:avLst>
+              <a:gd name="adj" fmla="val 11289"/>
+            </a:avLst>
           </a:prstGeom>
           <a:noFill/>
           <a:ln w="9525">
@@ -29542,8 +30275,10 @@
             <a:off x="685800" y="2352233"/>
             <a:ext cx="4200525" cy="2114550"/>
           </a:xfrm>
-          <a:prstGeom prst="rect">
-            <a:avLst/>
+          <a:prstGeom prst="roundRect">
+            <a:avLst>
+              <a:gd name="adj" fmla="val 9117"/>
+            </a:avLst>
           </a:prstGeom>
           <a:noFill/>
         </p:spPr>
@@ -29568,8 +30303,10 @@
             <a:off x="685800" y="4905376"/>
             <a:ext cx="4343400" cy="1533525"/>
           </a:xfrm>
-          <a:prstGeom prst="rect">
-            <a:avLst/>
+          <a:prstGeom prst="roundRect">
+            <a:avLst>
+              <a:gd name="adj" fmla="val 6256"/>
+            </a:avLst>
           </a:prstGeom>
           <a:noFill/>
         </p:spPr>
@@ -30274,7 +31011,7 @@
               <a:tabLst/>
             </a:pPr>
             <a:r>
-              <a:rPr lang="en-US" sz="2800" noProof="1" smtClean="0">
+              <a:rPr lang="en-US" noProof="1" smtClean="0">
                 <a:solidFill>
                   <a:schemeClr val="accent5">
                     <a:lumMod val="20000"/>
@@ -30286,7 +31023,7 @@
               </a:rPr>
               <a:t>&lt;HeaderTemplate&gt;</a:t>
             </a:r>
-            <a:endParaRPr lang="en-US" sz="2800" noProof="1">
+            <a:endParaRPr lang="en-US" noProof="1">
               <a:solidFill>
                 <a:schemeClr val="accent5">
                   <a:lumMod val="20000"/>
@@ -30311,7 +31048,7 @@
               <a:tabLst/>
             </a:pPr>
             <a:r>
-              <a:rPr lang="en-US" sz="2800" noProof="1" smtClean="0">
+              <a:rPr lang="en-US" noProof="1" smtClean="0">
                 <a:solidFill>
                   <a:schemeClr val="accent5">
                     <a:lumMod val="20000"/>
@@ -30323,7 +31060,7 @@
               </a:rPr>
               <a:t>&lt;ItemTemplate&gt;</a:t>
             </a:r>
-            <a:endParaRPr lang="en-US" sz="2800" noProof="1">
+            <a:endParaRPr lang="en-US" noProof="1">
               <a:solidFill>
                 <a:schemeClr val="accent5">
                   <a:lumMod val="20000"/>
@@ -30348,7 +31085,7 @@
               <a:tabLst/>
             </a:pPr>
             <a:r>
-              <a:rPr lang="en-US" sz="2800" noProof="1" smtClean="0">
+              <a:rPr lang="en-US" noProof="1" smtClean="0">
                 <a:solidFill>
                   <a:schemeClr val="accent5">
                     <a:lumMod val="20000"/>
@@ -30360,7 +31097,7 @@
               </a:rPr>
               <a:t>&lt;AlternatingItemTemplate&gt;</a:t>
             </a:r>
-            <a:endParaRPr lang="en-US" sz="2800" noProof="1">
+            <a:endParaRPr lang="en-US" noProof="1">
               <a:solidFill>
                 <a:schemeClr val="accent5">
                   <a:lumMod val="20000"/>
@@ -30385,7 +31122,7 @@
               <a:tabLst/>
             </a:pPr>
             <a:r>
-              <a:rPr lang="en-US" sz="2800" noProof="1" smtClean="0">
+              <a:rPr lang="en-US" noProof="1" smtClean="0">
                 <a:solidFill>
                   <a:schemeClr val="accent5">
                     <a:lumMod val="20000"/>
@@ -30412,10 +31149,10 @@
               <a:tabLst/>
             </a:pPr>
             <a:r>
-              <a:rPr lang="en-US" sz="2800" noProof="1" smtClean="0"/>
+              <a:rPr lang="en-US" noProof="1" smtClean="0"/>
               <a:t>Example:</a:t>
             </a:r>
-            <a:endParaRPr lang="en-US" sz="2800" noProof="1"/>
+            <a:endParaRPr lang="en-US" noProof="1"/>
           </a:p>
         </p:txBody>
       </p:sp>
@@ -30465,7 +31202,7 @@
         </p:blipFill>
         <p:spPr bwMode="auto">
           <a:xfrm>
-            <a:off x="6206388" y="1264654"/>
+            <a:off x="6442076" y="1264654"/>
             <a:ext cx="2397124" cy="2469146"/>
           </a:xfrm>
           <a:prstGeom prst="rect">
@@ -30558,8 +31295,8 @@
         </p:nvSpPr>
         <p:spPr bwMode="auto">
           <a:xfrm>
-            <a:off x="3870250" y="1477926"/>
-            <a:ext cx="2232837" cy="53162"/>
+            <a:off x="4343400" y="1504506"/>
+            <a:ext cx="1835887" cy="26581"/>
           </a:xfrm>
           <a:prstGeom prst="line">
             <a:avLst/>
@@ -30602,9 +31339,9 @@
           <p:nvPr/>
         </p:nvSpPr>
         <p:spPr bwMode="auto">
-          <a:xfrm>
-            <a:off x="3505200" y="1981200"/>
-            <a:ext cx="2597888" cy="49619"/>
+          <a:xfrm flipV="1">
+            <a:off x="3870250" y="2030819"/>
+            <a:ext cx="2232838" cy="51390"/>
           </a:xfrm>
           <a:prstGeom prst="line">
             <a:avLst/>
@@ -30648,8 +31385,8 @@
         </p:nvSpPr>
         <p:spPr bwMode="auto">
           <a:xfrm>
-            <a:off x="5638801" y="2499227"/>
-            <a:ext cx="464287" cy="20690"/>
+            <a:off x="5940425" y="2499227"/>
+            <a:ext cx="501651" cy="0"/>
           </a:xfrm>
           <a:prstGeom prst="line">
             <a:avLst/>
@@ -30693,8 +31430,8 @@
         </p:nvSpPr>
         <p:spPr bwMode="auto">
           <a:xfrm>
-            <a:off x="3880884" y="3019647"/>
-            <a:ext cx="2222204" cy="435934"/>
+            <a:off x="4343400" y="3237613"/>
+            <a:ext cx="1759688" cy="217967"/>
           </a:xfrm>
           <a:prstGeom prst="line">
             <a:avLst/>
@@ -32693,7 +33430,7 @@
         <p:spPr>
           <a:xfrm>
             <a:off x="609600" y="3819862"/>
-            <a:ext cx="7924800" cy="2657138"/>
+            <a:ext cx="7924800" cy="2862322"/>
           </a:xfrm>
           <a:prstGeom prst="rect">
             <a:avLst/>
@@ -32984,11 +33721,6 @@
             </a:r>
           </a:p>
           <a:p>
-            <a:pPr>
-              <a:lnSpc>
-                <a:spcPts val="1600"/>
-              </a:lnSpc>
-            </a:pPr>
             <a:r>
               <a:rPr lang="en-US" noProof="1" smtClean="0"/>
               <a:t>  string[] towns = { "Sofia", "Plovdiv", "Varna" };</a:t>
@@ -33007,11 +33739,6 @@
             </a:r>
           </a:p>
           <a:p>
-            <a:pPr>
-              <a:lnSpc>
-                <a:spcPts val="1600"/>
-              </a:lnSpc>
-            </a:pPr>
             <a:r>
               <a:rPr lang="en-US" noProof="1" smtClean="0"/>
               <a:t>}</a:t>
@@ -34336,8 +35063,8 @@
         </p:nvSpPr>
         <p:spPr bwMode="auto">
           <a:xfrm>
-            <a:off x="685800" y="1066800"/>
-            <a:ext cx="7772402" cy="3120662"/>
+            <a:off x="519114" y="1066800"/>
+            <a:ext cx="8105774" cy="3139321"/>
           </a:xfrm>
           <a:prstGeom prst="rect">
             <a:avLst/>
@@ -34479,6 +35206,23 @@
                 <a:latin typeface="Consolas" pitchFamily="49" charset="0"/>
                 <a:cs typeface="Consolas" pitchFamily="49" charset="0"/>
               </a:rPr>
+              <a:t> </a:t>
+            </a:r>
+            <a:r>
+              <a:rPr lang="en-US" sz="2000" b="1" noProof="1" smtClean="0">
+                <a:solidFill>
+                  <a:srgbClr val="8CF4F2"/>
+                </a:solidFill>
+                <a:effectLst>
+                  <a:outerShdw blurRad="38100" dist="38100" dir="2700000" algn="tl">
+                    <a:srgbClr val="000000">
+                      <a:alpha val="43137"/>
+                    </a:srgbClr>
+                  </a:outerShdw>
+                </a:effectLst>
+                <a:latin typeface="Consolas" pitchFamily="49" charset="0"/>
+                <a:cs typeface="Consolas" pitchFamily="49" charset="0"/>
+              </a:rPr>
               <a:t> &lt;</a:t>
             </a:r>
             <a:r>
@@ -34547,7 +35291,41 @@
                 <a:latin typeface="Consolas" pitchFamily="49" charset="0"/>
                 <a:cs typeface="Consolas" pitchFamily="49" charset="0"/>
               </a:rPr>
-              <a:t>  &lt;%# DataBinder.Eval(Container.DataItem</a:t>
+              <a:t>  </a:t>
+            </a:r>
+            <a:r>
+              <a:rPr lang="en-US" sz="2000" b="1" noProof="1" smtClean="0">
+                <a:solidFill>
+                  <a:srgbClr val="8CF4F2"/>
+                </a:solidFill>
+                <a:effectLst>
+                  <a:outerShdw blurRad="38100" dist="38100" dir="2700000" algn="tl">
+                    <a:srgbClr val="000000">
+                      <a:alpha val="43137"/>
+                    </a:srgbClr>
+                  </a:outerShdw>
+                </a:effectLst>
+                <a:latin typeface="Consolas" pitchFamily="49" charset="0"/>
+                <a:cs typeface="Consolas" pitchFamily="49" charset="0"/>
+              </a:rPr>
+              <a:t>  &lt;%# </a:t>
+            </a:r>
+            <a:r>
+              <a:rPr lang="en-US" sz="2000" b="1" noProof="1" smtClean="0">
+                <a:solidFill>
+                  <a:srgbClr val="8CF4F2"/>
+                </a:solidFill>
+                <a:effectLst>
+                  <a:outerShdw blurRad="38100" dist="38100" dir="2700000" algn="tl">
+                    <a:srgbClr val="000000">
+                      <a:alpha val="43137"/>
+                    </a:srgbClr>
+                  </a:outerShdw>
+                </a:effectLst>
+                <a:latin typeface="Consolas" pitchFamily="49" charset="0"/>
+                <a:cs typeface="Consolas" pitchFamily="49" charset="0"/>
+              </a:rPr>
+              <a:t>DataBinder.Eval(Container.DataItem</a:t>
             </a:r>
             <a:r>
               <a:rPr lang="en-US" sz="2000" b="1" noProof="1">
@@ -34615,7 +35393,41 @@
                 <a:latin typeface="Consolas" pitchFamily="49" charset="0"/>
                 <a:cs typeface="Consolas" pitchFamily="49" charset="0"/>
               </a:rPr>
-              <a:t>  &lt;%# DataBinder.Eval(Container.DataItem</a:t>
+              <a:t>  </a:t>
+            </a:r>
+            <a:r>
+              <a:rPr lang="en-US" sz="2000" b="1" noProof="1" smtClean="0">
+                <a:solidFill>
+                  <a:srgbClr val="8CF4F2"/>
+                </a:solidFill>
+                <a:effectLst>
+                  <a:outerShdw blurRad="38100" dist="38100" dir="2700000" algn="tl">
+                    <a:srgbClr val="000000">
+                      <a:alpha val="43137"/>
+                    </a:srgbClr>
+                  </a:outerShdw>
+                </a:effectLst>
+                <a:latin typeface="Consolas" pitchFamily="49" charset="0"/>
+                <a:cs typeface="Consolas" pitchFamily="49" charset="0"/>
+              </a:rPr>
+              <a:t>  &lt;%# </a:t>
+            </a:r>
+            <a:r>
+              <a:rPr lang="en-US" sz="2000" b="1" noProof="1" smtClean="0">
+                <a:solidFill>
+                  <a:srgbClr val="8CF4F2"/>
+                </a:solidFill>
+                <a:effectLst>
+                  <a:outerShdw blurRad="38100" dist="38100" dir="2700000" algn="tl">
+                    <a:srgbClr val="000000">
+                      <a:alpha val="43137"/>
+                    </a:srgbClr>
+                  </a:outerShdw>
+                </a:effectLst>
+                <a:latin typeface="Consolas" pitchFamily="49" charset="0"/>
+                <a:cs typeface="Consolas" pitchFamily="49" charset="0"/>
+              </a:rPr>
+              <a:t>DataBinder.Eval(Container.DataItem</a:t>
             </a:r>
             <a:r>
               <a:rPr lang="en-US" sz="2000" b="1" noProof="1">
@@ -34683,7 +35495,41 @@
                 <a:latin typeface="Consolas" pitchFamily="49" charset="0"/>
                 <a:cs typeface="Consolas" pitchFamily="49" charset="0"/>
               </a:rPr>
-              <a:t>  &lt;%# DataBinder.Eval(Container.DataItem</a:t>
+              <a:t>  </a:t>
+            </a:r>
+            <a:r>
+              <a:rPr lang="en-US" sz="2000" b="1" noProof="1" smtClean="0">
+                <a:solidFill>
+                  <a:srgbClr val="8CF4F2"/>
+                </a:solidFill>
+                <a:effectLst>
+                  <a:outerShdw blurRad="38100" dist="38100" dir="2700000" algn="tl">
+                    <a:srgbClr val="000000">
+                      <a:alpha val="43137"/>
+                    </a:srgbClr>
+                  </a:outerShdw>
+                </a:effectLst>
+                <a:latin typeface="Consolas" pitchFamily="49" charset="0"/>
+                <a:cs typeface="Consolas" pitchFamily="49" charset="0"/>
+              </a:rPr>
+              <a:t>  &lt;%# </a:t>
+            </a:r>
+            <a:r>
+              <a:rPr lang="en-US" sz="2000" b="1" noProof="1" smtClean="0">
+                <a:solidFill>
+                  <a:srgbClr val="8CF4F2"/>
+                </a:solidFill>
+                <a:effectLst>
+                  <a:outerShdw blurRad="38100" dist="38100" dir="2700000" algn="tl">
+                    <a:srgbClr val="000000">
+                      <a:alpha val="43137"/>
+                    </a:srgbClr>
+                  </a:outerShdw>
+                </a:effectLst>
+                <a:latin typeface="Consolas" pitchFamily="49" charset="0"/>
+                <a:cs typeface="Consolas" pitchFamily="49" charset="0"/>
+              </a:rPr>
+              <a:t>DataBinder.Eval(Container.DataItem</a:t>
             </a:r>
             <a:r>
               <a:rPr lang="en-US" sz="2000" b="1" noProof="1">
@@ -34751,7 +35597,41 @@
                 <a:latin typeface="Consolas" pitchFamily="49" charset="0"/>
                 <a:cs typeface="Consolas" pitchFamily="49" charset="0"/>
               </a:rPr>
-              <a:t>  &lt;%# DataBinder.Eval(Container.DataItem</a:t>
+              <a:t>  </a:t>
+            </a:r>
+            <a:r>
+              <a:rPr lang="en-US" sz="2000" b="1" noProof="1" smtClean="0">
+                <a:solidFill>
+                  <a:srgbClr val="8CF4F2"/>
+                </a:solidFill>
+                <a:effectLst>
+                  <a:outerShdw blurRad="38100" dist="38100" dir="2700000" algn="tl">
+                    <a:srgbClr val="000000">
+                      <a:alpha val="43137"/>
+                    </a:srgbClr>
+                  </a:outerShdw>
+                </a:effectLst>
+                <a:latin typeface="Consolas" pitchFamily="49" charset="0"/>
+                <a:cs typeface="Consolas" pitchFamily="49" charset="0"/>
+              </a:rPr>
+              <a:t>  &lt;%# </a:t>
+            </a:r>
+            <a:r>
+              <a:rPr lang="en-US" sz="2000" b="1" noProof="1" smtClean="0">
+                <a:solidFill>
+                  <a:srgbClr val="8CF4F2"/>
+                </a:solidFill>
+                <a:effectLst>
+                  <a:outerShdw blurRad="38100" dist="38100" dir="2700000" algn="tl">
+                    <a:srgbClr val="000000">
+                      <a:alpha val="43137"/>
+                    </a:srgbClr>
+                  </a:outerShdw>
+                </a:effectLst>
+                <a:latin typeface="Consolas" pitchFamily="49" charset="0"/>
+                <a:cs typeface="Consolas" pitchFamily="49" charset="0"/>
+              </a:rPr>
+              <a:t>DataBinder.Eval(Container.DataItem</a:t>
             </a:r>
             <a:r>
               <a:rPr lang="en-US" sz="2000" b="1" noProof="1">
@@ -34819,7 +35699,24 @@
                 <a:latin typeface="Consolas" pitchFamily="49" charset="0"/>
                 <a:cs typeface="Consolas" pitchFamily="49" charset="0"/>
               </a:rPr>
-              <a:t>  </a:t>
+              <a:t> </a:t>
+            </a:r>
+            <a:r>
+              <a:rPr lang="en-US" sz="2000" b="1" noProof="1" smtClean="0">
+                <a:solidFill>
+                  <a:srgbClr val="8CF4F2"/>
+                </a:solidFill>
+                <a:effectLst>
+                  <a:outerShdw blurRad="38100" dist="38100" dir="2700000" algn="tl">
+                    <a:srgbClr val="000000">
+                      <a:alpha val="43137"/>
+                    </a:srgbClr>
+                  </a:outerShdw>
+                </a:effectLst>
+                <a:latin typeface="Consolas" pitchFamily="49" charset="0"/>
+                <a:cs typeface="Consolas" pitchFamily="49" charset="0"/>
+              </a:rPr>
+              <a:t>   </a:t>
             </a:r>
             <a:r>
               <a:rPr lang="en-US" sz="2000" b="1" noProof="1">
@@ -34872,6 +35769,23 @@
               </a:buClr>
               <a:buSzPct val="70000"/>
             </a:pPr>
+            <a:r>
+              <a:rPr lang="en-US" sz="2000" b="1" noProof="1" smtClean="0">
+                <a:solidFill>
+                  <a:srgbClr val="8CF4F2"/>
+                </a:solidFill>
+                <a:effectLst>
+                  <a:outerShdw blurRad="38100" dist="38100" dir="2700000" algn="tl">
+                    <a:srgbClr val="000000">
+                      <a:alpha val="43137"/>
+                    </a:srgbClr>
+                  </a:outerShdw>
+                </a:effectLst>
+                <a:latin typeface="Consolas" pitchFamily="49" charset="0"/>
+                <a:cs typeface="Consolas" pitchFamily="49" charset="0"/>
+              </a:rPr>
+              <a:t> </a:t>
+            </a:r>
             <a:r>
               <a:rPr lang="en-US" sz="2000" b="1" noProof="1" smtClean="0">
                 <a:solidFill>
@@ -34995,8 +35909,10 @@
             <a:off x="2133600" y="3810000"/>
             <a:ext cx="6491288" cy="2445489"/>
           </a:xfrm>
-          <a:prstGeom prst="rect">
-            <a:avLst/>
+          <a:prstGeom prst="roundRect">
+            <a:avLst>
+              <a:gd name="adj" fmla="val 5984"/>
+            </a:avLst>
           </a:prstGeom>
           <a:noFill/>
         </p:spPr>
@@ -35457,7 +36373,41 @@
                 <a:latin typeface="Consolas" pitchFamily="49" charset="0"/>
                 <a:cs typeface="Consolas" pitchFamily="49" charset="0"/>
               </a:rPr>
-              <a:t>        Container.DataItem, "</a:t>
+              <a:t>       </a:t>
+            </a:r>
+            <a:r>
+              <a:rPr lang="en-US" sz="2000" b="1" noProof="1" smtClean="0">
+                <a:solidFill>
+                  <a:srgbClr val="8CF4F2"/>
+                </a:solidFill>
+                <a:effectLst>
+                  <a:outerShdw blurRad="38100" dist="38100" dir="2700000" algn="tl">
+                    <a:srgbClr val="000000">
+                      <a:alpha val="43137"/>
+                    </a:srgbClr>
+                  </a:outerShdw>
+                </a:effectLst>
+                <a:latin typeface="Consolas" pitchFamily="49" charset="0"/>
+                <a:cs typeface="Consolas" pitchFamily="49" charset="0"/>
+              </a:rPr>
+              <a:t>Container.DataItem</a:t>
+            </a:r>
+            <a:r>
+              <a:rPr lang="en-US" sz="2000" b="1" noProof="1" smtClean="0">
+                <a:solidFill>
+                  <a:srgbClr val="8CF4F2"/>
+                </a:solidFill>
+                <a:effectLst>
+                  <a:outerShdw blurRad="38100" dist="38100" dir="2700000" algn="tl">
+                    <a:srgbClr val="000000">
+                      <a:alpha val="43137"/>
+                    </a:srgbClr>
+                  </a:outerShdw>
+                </a:effectLst>
+                <a:latin typeface="Consolas" pitchFamily="49" charset="0"/>
+                <a:cs typeface="Consolas" pitchFamily="49" charset="0"/>
+              </a:rPr>
+              <a:t>, "</a:t>
             </a:r>
             <a:r>
               <a:rPr lang="en-US" sz="2000" b="1" noProof="1">
@@ -35957,8 +36907,8 @@
         </p:nvSpPr>
         <p:spPr bwMode="auto">
           <a:xfrm>
-            <a:off x="614364" y="1296988"/>
-            <a:ext cx="7920036" cy="3477875"/>
+            <a:off x="309564" y="1143000"/>
+            <a:ext cx="8529636" cy="3816429"/>
           </a:xfrm>
           <a:prstGeom prst="rect">
             <a:avLst/>
@@ -35998,7 +36948,7 @@
               <a:buSzPct val="70000"/>
             </a:pPr>
             <a:r>
-              <a:rPr lang="en-US" sz="2000" b="1" noProof="1">
+              <a:rPr lang="en-US" sz="2200" b="1" noProof="1">
                 <a:solidFill>
                   <a:srgbClr val="8CF4F2"/>
                 </a:solidFill>
@@ -36015,7 +36965,7 @@
               <a:t>&lt;asp:Repeater id</a:t>
             </a:r>
             <a:r>
-              <a:rPr lang="en-US" sz="2000" b="1" noProof="1" smtClean="0">
+              <a:rPr lang="en-US" sz="2200" b="1" noProof="1" smtClean="0">
                 <a:solidFill>
                   <a:srgbClr val="8CF4F2"/>
                 </a:solidFill>
@@ -36029,10 +36979,10 @@
                 <a:latin typeface="Consolas" pitchFamily="49" charset="0"/>
                 <a:cs typeface="Consolas" pitchFamily="49" charset="0"/>
               </a:rPr>
-              <a:t>="RepeaterSitesImage</a:t>
-            </a:r>
-            <a:r>
-              <a:rPr lang="en-US" sz="2000" b="1" noProof="1">
+              <a:t>="</a:t>
+            </a:r>
+            <a:r>
+              <a:rPr lang="en-US" sz="2200" b="1" noProof="1" smtClean="0">
                 <a:solidFill>
                   <a:srgbClr val="8CF4F2"/>
                 </a:solidFill>
@@ -36046,7 +36996,24 @@
                 <a:latin typeface="Consolas" pitchFamily="49" charset="0"/>
                 <a:cs typeface="Consolas" pitchFamily="49" charset="0"/>
               </a:rPr>
-              <a:t>" runat="server"&gt;</a:t>
+              <a:t>RepeaterSitesImage" runat</a:t>
+            </a:r>
+            <a:r>
+              <a:rPr lang="en-US" sz="2200" b="1" noProof="1">
+                <a:solidFill>
+                  <a:srgbClr val="8CF4F2"/>
+                </a:solidFill>
+                <a:effectLst>
+                  <a:outerShdw blurRad="38100" dist="38100" dir="2700000" algn="tl">
+                    <a:srgbClr val="000000">
+                      <a:alpha val="43137"/>
+                    </a:srgbClr>
+                  </a:outerShdw>
+                </a:effectLst>
+                <a:latin typeface="Consolas" pitchFamily="49" charset="0"/>
+                <a:cs typeface="Consolas" pitchFamily="49" charset="0"/>
+              </a:rPr>
+              <a:t>="server"&gt;</a:t>
             </a:r>
           </a:p>
           <a:p>
@@ -36063,7 +37030,7 @@
               <a:buSzPct val="70000"/>
             </a:pPr>
             <a:r>
-              <a:rPr lang="en-US" sz="2000" b="1" noProof="1">
+              <a:rPr lang="en-US" sz="2200" b="1" noProof="1">
                 <a:solidFill>
                   <a:srgbClr val="8CF4F2"/>
                 </a:solidFill>
@@ -36094,7 +37061,7 @@
               <a:buSzPct val="70000"/>
             </a:pPr>
             <a:r>
-              <a:rPr lang="en-US" sz="2000" b="1" noProof="1">
+              <a:rPr lang="en-US" sz="2200" b="1" noProof="1">
                 <a:solidFill>
                   <a:srgbClr val="8CF4F2"/>
                 </a:solidFill>
@@ -36111,7 +37078,7 @@
               <a:t>    &lt;a href="&lt;%# DataBinder.Eval</a:t>
             </a:r>
             <a:r>
-              <a:rPr lang="en-US" sz="2000" b="1" noProof="1" smtClean="0">
+              <a:rPr lang="en-US" sz="2200" b="1" noProof="1" smtClean="0">
                 <a:solidFill>
                   <a:srgbClr val="8CF4F2"/>
                 </a:solidFill>
@@ -36142,7 +37109,7 @@
               <a:buSzPct val="70000"/>
             </a:pPr>
             <a:r>
-              <a:rPr lang="en-US" sz="2000" b="1" noProof="1">
+              <a:rPr lang="en-US" sz="2200" b="1" noProof="1">
                 <a:solidFill>
                   <a:srgbClr val="8CF4F2"/>
                 </a:solidFill>
@@ -36159,7 +37126,7 @@
               <a:t> </a:t>
             </a:r>
             <a:r>
-              <a:rPr lang="en-US" sz="2000" b="1" noProof="1" smtClean="0">
+              <a:rPr lang="en-US" sz="2200" b="1" noProof="1" smtClean="0">
                 <a:solidFill>
                   <a:srgbClr val="8CF4F2"/>
                 </a:solidFill>
@@ -36173,10 +37140,44 @@
                 <a:latin typeface="Consolas" pitchFamily="49" charset="0"/>
                 <a:cs typeface="Consolas" pitchFamily="49" charset="0"/>
               </a:rPr>
-              <a:t>     Container.DataItem, "</a:t>
-            </a:r>
-            <a:r>
-              <a:rPr lang="en-US" sz="2000" b="1" noProof="1">
+              <a:t>    </a:t>
+            </a:r>
+            <a:r>
+              <a:rPr lang="en-US" sz="2200" b="1" noProof="1" smtClean="0">
+                <a:solidFill>
+                  <a:srgbClr val="8CF4F2"/>
+                </a:solidFill>
+                <a:effectLst>
+                  <a:outerShdw blurRad="38100" dist="38100" dir="2700000" algn="tl">
+                    <a:srgbClr val="000000">
+                      <a:alpha val="43137"/>
+                    </a:srgbClr>
+                  </a:outerShdw>
+                </a:effectLst>
+                <a:latin typeface="Consolas" pitchFamily="49" charset="0"/>
+                <a:cs typeface="Consolas" pitchFamily="49" charset="0"/>
+              </a:rPr>
+              <a:t>Container.DataItem</a:t>
+            </a:r>
+            <a:r>
+              <a:rPr lang="en-US" sz="2200" b="1" noProof="1" smtClean="0">
+                <a:solidFill>
+                  <a:srgbClr val="8CF4F2"/>
+                </a:solidFill>
+                <a:effectLst>
+                  <a:outerShdw blurRad="38100" dist="38100" dir="2700000" algn="tl">
+                    <a:srgbClr val="000000">
+                      <a:alpha val="43137"/>
+                    </a:srgbClr>
+                  </a:outerShdw>
+                </a:effectLst>
+                <a:latin typeface="Consolas" pitchFamily="49" charset="0"/>
+                <a:cs typeface="Consolas" pitchFamily="49" charset="0"/>
+              </a:rPr>
+              <a:t>, "</a:t>
+            </a:r>
+            <a:r>
+              <a:rPr lang="en-US" sz="2200" b="1" noProof="1">
                 <a:solidFill>
                   <a:srgbClr val="8CF4F2"/>
                 </a:solidFill>
@@ -36207,7 +37208,7 @@
               <a:buSzPct val="70000"/>
             </a:pPr>
             <a:r>
-              <a:rPr lang="en-US" sz="2000" b="1" noProof="1" smtClean="0">
+              <a:rPr lang="en-US" sz="2200" b="1" noProof="1" smtClean="0">
                 <a:solidFill>
                   <a:srgbClr val="8CF4F2"/>
                 </a:solidFill>
@@ -36224,7 +37225,7 @@
               <a:t>      </a:t>
             </a:r>
             <a:r>
-              <a:rPr lang="en-US" sz="2000" b="1" noProof="1">
+              <a:rPr lang="en-US" sz="2200" b="1" noProof="1">
                 <a:solidFill>
                   <a:srgbClr val="8CF4F2"/>
                 </a:solidFill>
@@ -36241,7 +37242,7 @@
               <a:t>&lt;img src</a:t>
             </a:r>
             <a:r>
-              <a:rPr lang="en-US" sz="2000" b="1" noProof="1" smtClean="0">
+              <a:rPr lang="en-US" sz="2200" b="1" noProof="1" smtClean="0">
                 <a:solidFill>
                   <a:srgbClr val="8CF4F2"/>
                 </a:solidFill>
@@ -36272,7 +37273,7 @@
               <a:buSzPct val="70000"/>
             </a:pPr>
             <a:r>
-              <a:rPr lang="en-US" sz="2000" b="1" noProof="1">
+              <a:rPr lang="en-US" sz="2200" b="1" noProof="1">
                 <a:solidFill>
                   <a:srgbClr val="8CF4F2"/>
                 </a:solidFill>
@@ -36289,7 +37290,7 @@
               <a:t> </a:t>
             </a:r>
             <a:r>
-              <a:rPr lang="en-US" sz="2000" b="1" noProof="1" smtClean="0">
+              <a:rPr lang="en-US" sz="2200" b="1" noProof="1" smtClean="0">
                 <a:solidFill>
                   <a:srgbClr val="8CF4F2"/>
                 </a:solidFill>
@@ -36303,10 +37304,10 @@
                 <a:latin typeface="Consolas" pitchFamily="49" charset="0"/>
                 <a:cs typeface="Consolas" pitchFamily="49" charset="0"/>
               </a:rPr>
-              <a:t>       Container.DataItem</a:t>
-            </a:r>
-            <a:r>
-              <a:rPr lang="en-US" sz="2000" b="1" noProof="1">
+              <a:t>      </a:t>
+            </a:r>
+            <a:r>
+              <a:rPr lang="en-US" sz="2200" b="1" noProof="1" smtClean="0">
                 <a:solidFill>
                   <a:srgbClr val="8CF4F2"/>
                 </a:solidFill>
@@ -36320,10 +37321,27 @@
                 <a:latin typeface="Consolas" pitchFamily="49" charset="0"/>
                 <a:cs typeface="Consolas" pitchFamily="49" charset="0"/>
               </a:rPr>
+              <a:t>Container.DataItem</a:t>
+            </a:r>
+            <a:r>
+              <a:rPr lang="en-US" sz="2200" b="1" noProof="1">
+                <a:solidFill>
+                  <a:srgbClr val="8CF4F2"/>
+                </a:solidFill>
+                <a:effectLst>
+                  <a:outerShdw blurRad="38100" dist="38100" dir="2700000" algn="tl">
+                    <a:srgbClr val="000000">
+                      <a:alpha val="43137"/>
+                    </a:srgbClr>
+                  </a:outerShdw>
+                </a:effectLst>
+                <a:latin typeface="Consolas" pitchFamily="49" charset="0"/>
+                <a:cs typeface="Consolas" pitchFamily="49" charset="0"/>
+              </a:rPr>
               <a:t>, "</a:t>
             </a:r>
             <a:r>
-              <a:rPr lang="en-US" sz="2000" b="1" noProof="1" smtClean="0">
+              <a:rPr lang="en-US" sz="2200" b="1" noProof="1" smtClean="0">
                 <a:solidFill>
                   <a:srgbClr val="8CF4F2"/>
                 </a:solidFill>
@@ -36340,7 +37358,7 @@
               <a:t>ImageUrl") </a:t>
             </a:r>
             <a:r>
-              <a:rPr lang="en-US" sz="2000" b="1" noProof="1">
+              <a:rPr lang="en-US" sz="2200" b="1" noProof="1">
                 <a:solidFill>
                   <a:srgbClr val="8CF4F2"/>
                 </a:solidFill>
@@ -36371,7 +37389,7 @@
               <a:buSzPct val="70000"/>
             </a:pPr>
             <a:r>
-              <a:rPr lang="en-US" sz="2000" b="1" noProof="1" smtClean="0">
+              <a:rPr lang="en-US" sz="2200" b="1" noProof="1" smtClean="0">
                 <a:solidFill>
                   <a:srgbClr val="8CF4F2"/>
                 </a:solidFill>
@@ -36385,10 +37403,10 @@
                 <a:latin typeface="Consolas" pitchFamily="49" charset="0"/>
                 <a:cs typeface="Consolas" pitchFamily="49" charset="0"/>
               </a:rPr>
-              <a:t>        </a:t>
-            </a:r>
-            <a:r>
-              <a:rPr lang="en-US" sz="2000" b="1" noProof="1">
+              <a:t>       </a:t>
+            </a:r>
+            <a:r>
+              <a:rPr lang="en-US" sz="2200" b="1" noProof="1" smtClean="0">
                 <a:solidFill>
                   <a:srgbClr val="8CF4F2"/>
                 </a:solidFill>
@@ -36402,10 +37420,10 @@
                 <a:latin typeface="Consolas" pitchFamily="49" charset="0"/>
                 <a:cs typeface="Consolas" pitchFamily="49" charset="0"/>
               </a:rPr>
-              <a:t>border="</a:t>
-            </a:r>
-            <a:r>
-              <a:rPr lang="en-US" sz="2000" b="1" noProof="1" smtClean="0">
+              <a:t>border</a:t>
+            </a:r>
+            <a:r>
+              <a:rPr lang="en-US" sz="2200" b="1" noProof="1">
                 <a:solidFill>
                   <a:srgbClr val="8CF4F2"/>
                 </a:solidFill>
@@ -36419,10 +37437,27 @@
                 <a:latin typeface="Consolas" pitchFamily="49" charset="0"/>
                 <a:cs typeface="Consolas" pitchFamily="49" charset="0"/>
               </a:rPr>
+              <a:t>="</a:t>
+            </a:r>
+            <a:r>
+              <a:rPr lang="en-US" sz="2200" b="1" noProof="1" smtClean="0">
+                <a:solidFill>
+                  <a:srgbClr val="8CF4F2"/>
+                </a:solidFill>
+                <a:effectLst>
+                  <a:outerShdw blurRad="38100" dist="38100" dir="2700000" algn="tl">
+                    <a:srgbClr val="000000">
+                      <a:alpha val="43137"/>
+                    </a:srgbClr>
+                  </a:outerShdw>
+                </a:effectLst>
+                <a:latin typeface="Consolas" pitchFamily="49" charset="0"/>
+                <a:cs typeface="Consolas" pitchFamily="49" charset="0"/>
+              </a:rPr>
               <a:t>0" alt</a:t>
             </a:r>
             <a:r>
-              <a:rPr lang="en-US" sz="2000" b="1" noProof="1">
+              <a:rPr lang="en-US" sz="2200" b="1" noProof="1">
                 <a:solidFill>
                   <a:srgbClr val="8CF4F2"/>
                 </a:solidFill>
@@ -36439,7 +37474,7 @@
               <a:t>="&lt;%# DataBinder.Eval</a:t>
             </a:r>
             <a:r>
-              <a:rPr lang="en-US" sz="2000" b="1" noProof="1" smtClean="0">
+              <a:rPr lang="en-US" sz="2200" b="1" noProof="1" smtClean="0">
                 <a:solidFill>
                   <a:srgbClr val="8CF4F2"/>
                 </a:solidFill>
@@ -36455,7 +37490,7 @@
               </a:rPr>
               <a:t>(</a:t>
             </a:r>
-            <a:endParaRPr lang="bg-BG" sz="2000" b="1" noProof="1" smtClean="0">
+            <a:endParaRPr lang="bg-BG" sz="2200" b="1" noProof="1" smtClean="0">
               <a:solidFill>
                 <a:srgbClr val="8CF4F2"/>
               </a:solidFill>
@@ -36484,7 +37519,7 @@
               <a:buSzPct val="70000"/>
             </a:pPr>
             <a:r>
-              <a:rPr lang="en-US" sz="2000" b="1" noProof="1" smtClean="0">
+              <a:rPr lang="en-US" sz="2200" b="1" noProof="1" smtClean="0">
                 <a:solidFill>
                   <a:srgbClr val="8CF4F2"/>
                 </a:solidFill>
@@ -36498,10 +37533,27 @@
                 <a:latin typeface="Consolas" pitchFamily="49" charset="0"/>
                 <a:cs typeface="Consolas" pitchFamily="49" charset="0"/>
               </a:rPr>
-              <a:t>        Container.DataItem</a:t>
-            </a:r>
-            <a:r>
-              <a:rPr lang="en-US" sz="2000" b="1" noProof="1">
+              <a:t>       </a:t>
+            </a:r>
+            <a:r>
+              <a:rPr lang="en-US" sz="2200" b="1" noProof="1" smtClean="0">
+                <a:solidFill>
+                  <a:srgbClr val="8CF4F2"/>
+                </a:solidFill>
+                <a:effectLst>
+                  <a:outerShdw blurRad="38100" dist="38100" dir="2700000" algn="tl">
+                    <a:srgbClr val="000000">
+                      <a:alpha val="43137"/>
+                    </a:srgbClr>
+                  </a:outerShdw>
+                </a:effectLst>
+                <a:latin typeface="Consolas" pitchFamily="49" charset="0"/>
+                <a:cs typeface="Consolas" pitchFamily="49" charset="0"/>
+              </a:rPr>
+              <a:t>Container.DataItem</a:t>
+            </a:r>
+            <a:r>
+              <a:rPr lang="en-US" sz="2200" b="1" noProof="1">
                 <a:solidFill>
                   <a:srgbClr val="8CF4F2"/>
                 </a:solidFill>
@@ -36532,7 +37584,7 @@
               <a:buSzPct val="70000"/>
             </a:pPr>
             <a:r>
-              <a:rPr lang="en-US" sz="2000" b="1" noProof="1">
+              <a:rPr lang="en-US" sz="2200" b="1" noProof="1">
                 <a:solidFill>
                   <a:srgbClr val="8CF4F2"/>
                 </a:solidFill>
@@ -36563,7 +37615,7 @@
               <a:buSzPct val="70000"/>
             </a:pPr>
             <a:r>
-              <a:rPr lang="en-US" sz="2000" b="1" noProof="1">
+              <a:rPr lang="en-US" sz="2200" b="1" noProof="1">
                 <a:solidFill>
                   <a:srgbClr val="8CF4F2"/>
                 </a:solidFill>
@@ -36594,7 +37646,7 @@
               <a:buSzPct val="70000"/>
             </a:pPr>
             <a:r>
-              <a:rPr lang="en-US" sz="2000" b="1" noProof="1">
+              <a:rPr lang="en-US" sz="2200" b="1" noProof="1">
                 <a:solidFill>
                   <a:srgbClr val="8CF4F2"/>
                 </a:solidFill>
@@ -36630,7 +37682,7 @@
         </p:blipFill>
         <p:spPr bwMode="auto">
           <a:xfrm>
-            <a:off x="4769283" y="3962400"/>
+            <a:off x="4802981" y="4370268"/>
             <a:ext cx="3350419" cy="2259132"/>
           </a:xfrm>
           <a:prstGeom prst="rect">
@@ -36952,7 +38004,12 @@
             <p:ph idx="1"/>
           </p:nvPr>
         </p:nvSpPr>
-        <p:spPr/>
+        <p:spPr>
+          <a:xfrm>
+            <a:off x="228600" y="914400"/>
+            <a:ext cx="8686800" cy="5638800"/>
+          </a:xfrm>
+        </p:spPr>
         <p:txBody>
           <a:bodyPr/>
           <a:lstStyle/>
@@ -39333,41 +40390,36 @@
             <p:ph idx="1"/>
           </p:nvPr>
         </p:nvSpPr>
-        <p:spPr/>
+        <p:spPr>
+          <a:xfrm>
+            <a:off x="228600" y="762000"/>
+            <a:ext cx="8686800" cy="5943600"/>
+          </a:xfrm>
+        </p:spPr>
         <p:txBody>
           <a:bodyPr/>
           <a:lstStyle/>
           <a:p>
             <a:pPr>
               <a:lnSpc>
-                <a:spcPct val="110000"/>
+                <a:spcPct val="90000"/>
               </a:lnSpc>
               <a:tabLst/>
             </a:pPr>
             <a:r>
-              <a:rPr lang="en-US" dirty="0"/>
-              <a:t>Controls that are bound to a data source are called </a:t>
-            </a:r>
-            <a:r>
-              <a:rPr lang="en-US" dirty="0">
-                <a:effectLst>
-                  <a:outerShdw blurRad="38100" dist="38100" dir="2700000" algn="tl">
-                    <a:srgbClr val="000000"/>
-                  </a:outerShdw>
-                </a:effectLst>
-              </a:rPr>
-              <a:t>list-bound controls</a:t>
+              <a:rPr lang="en-US" sz="3000" dirty="0"/>
+              <a:t>Controls that are bound to a data source are called list-bound controls</a:t>
             </a:r>
           </a:p>
           <a:p>
             <a:pPr>
               <a:lnSpc>
-                <a:spcPct val="110000"/>
+                <a:spcPct val="90000"/>
               </a:lnSpc>
               <a:tabLst/>
             </a:pPr>
             <a:r>
-              <a:rPr lang="en-US" noProof="1" smtClean="0">
+              <a:rPr lang="en-US" sz="3000" noProof="1" smtClean="0">
                 <a:solidFill>
                   <a:schemeClr val="accent5">
                     <a:lumMod val="20000"/>
@@ -39379,11 +40431,11 @@
               <a:t>ListBox</a:t>
             </a:r>
             <a:r>
-              <a:rPr lang="en-US" noProof="1"/>
+              <a:rPr lang="en-US" sz="3000" noProof="1"/>
               <a:t>, </a:t>
             </a:r>
             <a:r>
-              <a:rPr lang="en-US" noProof="1">
+              <a:rPr lang="en-US" sz="3000" noProof="1">
                 <a:solidFill>
                   <a:schemeClr val="accent5">
                     <a:lumMod val="20000"/>
@@ -39395,11 +40447,11 @@
               <a:t>DropDownList</a:t>
             </a:r>
             <a:r>
-              <a:rPr lang="en-US" noProof="1"/>
+              <a:rPr lang="en-US" sz="3000" noProof="1"/>
               <a:t>, </a:t>
             </a:r>
             <a:r>
-              <a:rPr lang="en-US" noProof="1" smtClean="0">
+              <a:rPr lang="en-US" sz="3000" noProof="1" smtClean="0">
                 <a:solidFill>
                   <a:schemeClr val="accent5">
                     <a:lumMod val="20000"/>
@@ -39411,7 +40463,7 @@
               <a:t>Checkbox</a:t>
             </a:r>
             <a:r>
-              <a:rPr lang="en-US" dirty="0" smtClean="0">
+              <a:rPr lang="en-US" sz="3000" dirty="0" smtClean="0">
                 <a:solidFill>
                   <a:schemeClr val="accent5">
                     <a:lumMod val="20000"/>
@@ -39423,7 +40475,7 @@
               <a:t>L</a:t>
             </a:r>
             <a:r>
-              <a:rPr lang="en-US" noProof="1" smtClean="0">
+              <a:rPr lang="en-US" sz="3000" noProof="1" smtClean="0">
                 <a:solidFill>
                   <a:schemeClr val="accent5">
                     <a:lumMod val="20000"/>
@@ -39435,11 +40487,11 @@
               <a:t>ist</a:t>
             </a:r>
             <a:r>
-              <a:rPr lang="en-US" noProof="1"/>
+              <a:rPr lang="en-US" sz="3000" noProof="1"/>
               <a:t>, </a:t>
             </a:r>
             <a:r>
-              <a:rPr lang="en-US" noProof="1" smtClean="0">
+              <a:rPr lang="en-US" sz="3000" noProof="1" smtClean="0">
                 <a:solidFill>
                   <a:schemeClr val="accent5">
                     <a:lumMod val="20000"/>
@@ -39450,7 +40502,7 @@
               </a:rPr>
               <a:t>RadioButtonList</a:t>
             </a:r>
-            <a:endParaRPr lang="bg-BG" dirty="0">
+            <a:endParaRPr lang="bg-BG" sz="3000" dirty="0">
               <a:solidFill>
                 <a:schemeClr val="accent5">
                   <a:lumMod val="20000"/>
@@ -39463,12 +40515,12 @@
           <a:p>
             <a:pPr>
               <a:lnSpc>
-                <a:spcPct val="110000"/>
+                <a:spcPct val="90000"/>
               </a:lnSpc>
               <a:tabLst/>
             </a:pPr>
             <a:r>
-              <a:rPr lang="en-US" noProof="1">
+              <a:rPr lang="en-US" sz="3000" noProof="1">
                 <a:solidFill>
                   <a:schemeClr val="accent5">
                     <a:lumMod val="20000"/>
@@ -39480,28 +40532,40 @@
               <a:t>DataList</a:t>
             </a:r>
             <a:r>
-              <a:rPr lang="bg-BG" dirty="0"/>
-              <a:t> – </a:t>
-            </a:r>
-            <a:r>
-              <a:rPr lang="en-US" dirty="0"/>
-              <a:t>shows data in a </a:t>
-            </a:r>
-            <a:r>
-              <a:rPr lang="en-US" dirty="0" smtClean="0"/>
+              <a:rPr lang="bg-BG" sz="3000" dirty="0"/>
+              <a:t> </a:t>
+            </a:r>
+            <a:endParaRPr lang="en-US" sz="3000" dirty="0"/>
+          </a:p>
+          <a:p>
+            <a:pPr lvl="1">
+              <a:lnSpc>
+                <a:spcPct val="90000"/>
+              </a:lnSpc>
+            </a:pPr>
+            <a:r>
+              <a:rPr lang="en-US" sz="2800" dirty="0" smtClean="0"/>
+              <a:t>Shows </a:t>
+            </a:r>
+            <a:r>
+              <a:rPr lang="en-US" sz="2800" dirty="0"/>
+              <a:t>data in a </a:t>
+            </a:r>
+            <a:r>
+              <a:rPr lang="en-US" sz="2800" dirty="0" smtClean="0"/>
               <a:t>template-based predefined pattern</a:t>
             </a:r>
-            <a:endParaRPr lang="bg-BG" dirty="0"/>
+            <a:endParaRPr lang="bg-BG" sz="2800" dirty="0"/>
           </a:p>
           <a:p>
             <a:pPr>
               <a:lnSpc>
-                <a:spcPct val="110000"/>
+                <a:spcPct val="90000"/>
               </a:lnSpc>
               <a:tabLst/>
             </a:pPr>
             <a:r>
-              <a:rPr lang="en-US" noProof="1">
+              <a:rPr lang="en-US" sz="3000" noProof="1">
                 <a:solidFill>
                   <a:schemeClr val="accent5">
                     <a:lumMod val="20000"/>
@@ -39513,20 +40577,36 @@
               <a:t>GridView</a:t>
             </a:r>
             <a:r>
-              <a:rPr lang="en-US" dirty="0"/>
-              <a:t> – shows data in a table</a:t>
-            </a:r>
-            <a:endParaRPr lang="bg-BG" dirty="0"/>
+              <a:rPr lang="en-US" sz="3000" dirty="0"/>
+              <a:t> </a:t>
+            </a:r>
+            <a:endParaRPr lang="en-US" sz="3000" dirty="0" smtClean="0"/>
+          </a:p>
+          <a:p>
+            <a:pPr lvl="1">
+              <a:lnSpc>
+                <a:spcPct val="90000"/>
+              </a:lnSpc>
+            </a:pPr>
+            <a:r>
+              <a:rPr lang="en-US" sz="2800" dirty="0" smtClean="0"/>
+              <a:t>Shows </a:t>
+            </a:r>
+            <a:r>
+              <a:rPr lang="en-US" sz="2800" dirty="0"/>
+              <a:t>data in a table</a:t>
+            </a:r>
+            <a:endParaRPr lang="bg-BG" sz="2800" dirty="0"/>
           </a:p>
           <a:p>
             <a:pPr>
               <a:lnSpc>
-                <a:spcPct val="110000"/>
+                <a:spcPct val="90000"/>
               </a:lnSpc>
               <a:tabLst/>
             </a:pPr>
             <a:r>
-              <a:rPr lang="en-US" noProof="1">
+              <a:rPr lang="en-US" sz="3000" noProof="1">
                 <a:solidFill>
                   <a:schemeClr val="accent5">
                     <a:lumMod val="20000"/>
@@ -39538,22 +40618,34 @@
               <a:t>Repeater</a:t>
             </a:r>
             <a:r>
-              <a:rPr lang="bg-BG" dirty="0"/>
-              <a:t> – </a:t>
-            </a:r>
-            <a:r>
-              <a:rPr lang="en-US" dirty="0"/>
-              <a:t>shows data in a template </a:t>
-            </a:r>
-            <a:r>
-              <a:rPr lang="en-US" dirty="0" smtClean="0"/>
+              <a:rPr lang="bg-BG" sz="3000" dirty="0"/>
+              <a:t> </a:t>
+            </a:r>
+            <a:endParaRPr lang="en-US" sz="3000" dirty="0" smtClean="0"/>
+          </a:p>
+          <a:p>
+            <a:pPr lvl="1">
+              <a:lnSpc>
+                <a:spcPct val="90000"/>
+              </a:lnSpc>
+            </a:pPr>
+            <a:r>
+              <a:rPr lang="en-US" sz="2800" dirty="0" smtClean="0"/>
+              <a:t>Shows </a:t>
+            </a:r>
+            <a:r>
+              <a:rPr lang="en-US" sz="2800" dirty="0"/>
+              <a:t>data in a template </a:t>
+            </a:r>
+            <a:r>
+              <a:rPr lang="en-US" sz="2800" dirty="0" smtClean="0"/>
               <a:t>designed </a:t>
             </a:r>
             <a:r>
-              <a:rPr lang="en-US" dirty="0"/>
+              <a:rPr lang="en-US" sz="2800" dirty="0"/>
               <a:t>by the programmer</a:t>
             </a:r>
-            <a:endParaRPr lang="en-US" noProof="1"/>
+            <a:endParaRPr lang="en-US" sz="2800" noProof="1"/>
           </a:p>
         </p:txBody>
       </p:sp>
@@ -40784,7 +41876,7 @@
         <a:sysClr val="windowText" lastClr="000000"/>
       </a:dk1>
       <a:lt1>
-        <a:sysClr val="window" lastClr="DBDBDB"/>
+        <a:sysClr val="window" lastClr="FFFFFF"/>
       </a:lt1>
       <a:dk2>
         <a:srgbClr val="1F497D"/>
@@ -41067,7 +42159,7 @@
         <a:sysClr val="windowText" lastClr="000000"/>
       </a:dk1>
       <a:lt1>
-        <a:sysClr val="window" lastClr="DBDBDB"/>
+        <a:sysClr val="window" lastClr="FFFFFF"/>
       </a:lt1>
       <a:dk2>
         <a:srgbClr val="1F497D"/>

</xml_diff>